<commit_message>
Master 4 | Changes made.
</commit_message>
<xml_diff>
--- a/sunum.pptx
+++ b/sunum.pptx
@@ -222,7 +222,7 @@
           <a:p>
             <a:fld id="{AAB31DC6-7D17-4974-9CEB-239AC6EB1FA4}" type="datetimeFigureOut">
               <a:rPr lang="en-GB" smtClean="0"/>
-              <a:t>19/12/2024</a:t>
+              <a:t>20/12/2024</a:t>
             </a:fld>
             <a:endParaRPr lang="en-GB"/>
           </a:p>
@@ -638,7 +638,7 @@
           <a:p>
             <a:fld id="{A597896A-EB45-4594-9EB7-34F64F323957}" type="datetimeFigureOut">
               <a:rPr lang="tr-TR" smtClean="0"/>
-              <a:t>19.12.2024</a:t>
+              <a:t>20.12.2024</a:t>
             </a:fld>
             <a:endParaRPr lang="tr-TR"/>
           </a:p>
@@ -838,7 +838,7 @@
           <a:p>
             <a:fld id="{A597896A-EB45-4594-9EB7-34F64F323957}" type="datetimeFigureOut">
               <a:rPr lang="tr-TR" smtClean="0"/>
-              <a:t>19.12.2024</a:t>
+              <a:t>20.12.2024</a:t>
             </a:fld>
             <a:endParaRPr lang="tr-TR"/>
           </a:p>
@@ -1048,7 +1048,7 @@
           <a:p>
             <a:fld id="{A597896A-EB45-4594-9EB7-34F64F323957}" type="datetimeFigureOut">
               <a:rPr lang="tr-TR" smtClean="0"/>
-              <a:t>19.12.2024</a:t>
+              <a:t>20.12.2024</a:t>
             </a:fld>
             <a:endParaRPr lang="tr-TR"/>
           </a:p>
@@ -1248,7 +1248,7 @@
           <a:p>
             <a:fld id="{A597896A-EB45-4594-9EB7-34F64F323957}" type="datetimeFigureOut">
               <a:rPr lang="tr-TR" smtClean="0"/>
-              <a:t>19.12.2024</a:t>
+              <a:t>20.12.2024</a:t>
             </a:fld>
             <a:endParaRPr lang="tr-TR"/>
           </a:p>
@@ -1524,7 +1524,7 @@
           <a:p>
             <a:fld id="{A597896A-EB45-4594-9EB7-34F64F323957}" type="datetimeFigureOut">
               <a:rPr lang="tr-TR" smtClean="0"/>
-              <a:t>19.12.2024</a:t>
+              <a:t>20.12.2024</a:t>
             </a:fld>
             <a:endParaRPr lang="tr-TR"/>
           </a:p>
@@ -1792,7 +1792,7 @@
           <a:p>
             <a:fld id="{A597896A-EB45-4594-9EB7-34F64F323957}" type="datetimeFigureOut">
               <a:rPr lang="tr-TR" smtClean="0"/>
-              <a:t>19.12.2024</a:t>
+              <a:t>20.12.2024</a:t>
             </a:fld>
             <a:endParaRPr lang="tr-TR"/>
           </a:p>
@@ -2207,7 +2207,7 @@
           <a:p>
             <a:fld id="{A597896A-EB45-4594-9EB7-34F64F323957}" type="datetimeFigureOut">
               <a:rPr lang="tr-TR" smtClean="0"/>
-              <a:t>19.12.2024</a:t>
+              <a:t>20.12.2024</a:t>
             </a:fld>
             <a:endParaRPr lang="tr-TR"/>
           </a:p>
@@ -2349,7 +2349,7 @@
           <a:p>
             <a:fld id="{A597896A-EB45-4594-9EB7-34F64F323957}" type="datetimeFigureOut">
               <a:rPr lang="tr-TR" smtClean="0"/>
-              <a:t>19.12.2024</a:t>
+              <a:t>20.12.2024</a:t>
             </a:fld>
             <a:endParaRPr lang="tr-TR"/>
           </a:p>
@@ -2462,7 +2462,7 @@
           <a:p>
             <a:fld id="{A597896A-EB45-4594-9EB7-34F64F323957}" type="datetimeFigureOut">
               <a:rPr lang="tr-TR" smtClean="0"/>
-              <a:t>19.12.2024</a:t>
+              <a:t>20.12.2024</a:t>
             </a:fld>
             <a:endParaRPr lang="tr-TR"/>
           </a:p>
@@ -2775,7 +2775,7 @@
           <a:p>
             <a:fld id="{A597896A-EB45-4594-9EB7-34F64F323957}" type="datetimeFigureOut">
               <a:rPr lang="tr-TR" smtClean="0"/>
-              <a:t>19.12.2024</a:t>
+              <a:t>20.12.2024</a:t>
             </a:fld>
             <a:endParaRPr lang="tr-TR"/>
           </a:p>
@@ -3064,7 +3064,7 @@
           <a:p>
             <a:fld id="{A597896A-EB45-4594-9EB7-34F64F323957}" type="datetimeFigureOut">
               <a:rPr lang="tr-TR" smtClean="0"/>
-              <a:t>19.12.2024</a:t>
+              <a:t>20.12.2024</a:t>
             </a:fld>
             <a:endParaRPr lang="tr-TR"/>
           </a:p>
@@ -3307,7 +3307,7 @@
           <a:p>
             <a:fld id="{A597896A-EB45-4594-9EB7-34F64F323957}" type="datetimeFigureOut">
               <a:rPr lang="tr-TR" smtClean="0"/>
-              <a:t>19.12.2024</a:t>
+              <a:t>20.12.2024</a:t>
             </a:fld>
             <a:endParaRPr lang="tr-TR"/>
           </a:p>
@@ -3757,7 +3757,19 @@
               <a:rPr lang="tr-TR" sz="6000" b="1" dirty="0">
                 <a:latin typeface="Century Gothic" panose="020B0502020202020204" pitchFamily="34" charset="0"/>
               </a:rPr>
-              <a:t>MountaIn Car &amp; Car RacIng</a:t>
+              <a:t>MountaIn Car &amp; Car Rac</a:t>
+            </a:r>
+            <a:r>
+              <a:rPr lang="tr-TR" b="1" dirty="0">
+                <a:latin typeface="Century Gothic" panose="020B0502020202020204" pitchFamily="34" charset="0"/>
+              </a:rPr>
+              <a:t>i</a:t>
+            </a:r>
+            <a:r>
+              <a:rPr lang="tr-TR" sz="6000" b="1" dirty="0">
+                <a:latin typeface="Century Gothic" panose="020B0502020202020204" pitchFamily="34" charset="0"/>
+              </a:rPr>
+              <a:t>ng</a:t>
             </a:r>
           </a:p>
         </p:txBody>
@@ -11829,7 +11841,7 @@
               <a:rPr lang="tr-TR" b="1" dirty="0" err="1">
                 <a:latin typeface="Century Gothic" panose="020B0502020202020204" pitchFamily="34" charset="0"/>
               </a:rPr>
-              <a:t>PolIicy</a:t>
+              <a:t>Policy</a:t>
             </a:r>
             <a:r>
               <a:rPr lang="tr-TR" b="1" dirty="0">

</xml_diff>

<commit_message>
Master 5 | Last update
</commit_message>
<xml_diff>
--- a/sunum.pptx
+++ b/sunum.pptx
@@ -5,35 +5,37 @@
     <p:sldMasterId id="2147484019" r:id="rId1"/>
   </p:sldMasterIdLst>
   <p:notesMasterIdLst>
-    <p:notesMasterId r:id="rId28"/>
+    <p:notesMasterId r:id="rId30"/>
   </p:notesMasterIdLst>
   <p:sldIdLst>
     <p:sldId id="256" r:id="rId2"/>
     <p:sldId id="257" r:id="rId3"/>
-    <p:sldId id="259" r:id="rId4"/>
-    <p:sldId id="262" r:id="rId5"/>
-    <p:sldId id="265" r:id="rId6"/>
-    <p:sldId id="273" r:id="rId7"/>
-    <p:sldId id="274" r:id="rId8"/>
-    <p:sldId id="261" r:id="rId9"/>
-    <p:sldId id="263" r:id="rId10"/>
-    <p:sldId id="266" r:id="rId11"/>
-    <p:sldId id="275" r:id="rId12"/>
-    <p:sldId id="276" r:id="rId13"/>
-    <p:sldId id="267" r:id="rId14"/>
-    <p:sldId id="268" r:id="rId15"/>
-    <p:sldId id="269" r:id="rId16"/>
-    <p:sldId id="277" r:id="rId17"/>
-    <p:sldId id="278" r:id="rId18"/>
-    <p:sldId id="270" r:id="rId19"/>
-    <p:sldId id="271" r:id="rId20"/>
-    <p:sldId id="272" r:id="rId21"/>
-    <p:sldId id="280" r:id="rId22"/>
-    <p:sldId id="283" r:id="rId23"/>
-    <p:sldId id="279" r:id="rId24"/>
-    <p:sldId id="281" r:id="rId25"/>
-    <p:sldId id="282" r:id="rId26"/>
-    <p:sldId id="284" r:id="rId27"/>
+    <p:sldId id="285" r:id="rId4"/>
+    <p:sldId id="259" r:id="rId5"/>
+    <p:sldId id="262" r:id="rId6"/>
+    <p:sldId id="265" r:id="rId7"/>
+    <p:sldId id="273" r:id="rId8"/>
+    <p:sldId id="274" r:id="rId9"/>
+    <p:sldId id="261" r:id="rId10"/>
+    <p:sldId id="263" r:id="rId11"/>
+    <p:sldId id="266" r:id="rId12"/>
+    <p:sldId id="275" r:id="rId13"/>
+    <p:sldId id="276" r:id="rId14"/>
+    <p:sldId id="267" r:id="rId15"/>
+    <p:sldId id="268" r:id="rId16"/>
+    <p:sldId id="269" r:id="rId17"/>
+    <p:sldId id="277" r:id="rId18"/>
+    <p:sldId id="278" r:id="rId19"/>
+    <p:sldId id="270" r:id="rId20"/>
+    <p:sldId id="271" r:id="rId21"/>
+    <p:sldId id="272" r:id="rId22"/>
+    <p:sldId id="280" r:id="rId23"/>
+    <p:sldId id="283" r:id="rId24"/>
+    <p:sldId id="279" r:id="rId25"/>
+    <p:sldId id="281" r:id="rId26"/>
+    <p:sldId id="282" r:id="rId27"/>
+    <p:sldId id="284" r:id="rId28"/>
+    <p:sldId id="286" r:id="rId29"/>
   </p:sldIdLst>
   <p:sldSz cx="12192000" cy="6858000"/>
   <p:notesSz cx="6858000" cy="9144000"/>
@@ -3896,6 +3898,136 @@
       </p:grpSpPr>
       <p:sp>
         <p:nvSpPr>
+          <p:cNvPr id="2" name="Title 1">
+            <a:extLst>
+              <a:ext uri="{FF2B5EF4-FFF2-40B4-BE49-F238E27FC236}">
+                <a16:creationId xmlns:a16="http://schemas.microsoft.com/office/drawing/2014/main" id="{47AED1C1-974B-2CFA-EA9D-D14CF0A051FD}"/>
+              </a:ext>
+            </a:extLst>
+          </p:cNvPr>
+          <p:cNvSpPr>
+            <a:spLocks noGrp="1"/>
+          </p:cNvSpPr>
+          <p:nvPr>
+            <p:ph type="title"/>
+          </p:nvPr>
+        </p:nvSpPr>
+        <p:spPr/>
+        <p:txBody>
+          <a:bodyPr/>
+          <a:lstStyle/>
+          <a:p>
+            <a:r>
+              <a:rPr lang="tr-TR" sz="4400" b="1" dirty="0" err="1">
+                <a:latin typeface="Century Gothic" panose="020B0502020202020204" pitchFamily="34" charset="0"/>
+              </a:rPr>
+              <a:t>Soft</a:t>
+            </a:r>
+            <a:r>
+              <a:rPr lang="tr-TR" sz="4400" b="1" dirty="0">
+                <a:latin typeface="Century Gothic" panose="020B0502020202020204" pitchFamily="34" charset="0"/>
+              </a:rPr>
+              <a:t> </a:t>
+            </a:r>
+            <a:r>
+              <a:rPr lang="tr-TR" sz="4400" b="1" dirty="0" err="1">
+                <a:latin typeface="Century Gothic" panose="020B0502020202020204" pitchFamily="34" charset="0"/>
+              </a:rPr>
+              <a:t>Policy</a:t>
+            </a:r>
+            <a:r>
+              <a:rPr lang="tr-TR" sz="4400" b="1" dirty="0">
+                <a:latin typeface="Century Gothic" panose="020B0502020202020204" pitchFamily="34" charset="0"/>
+              </a:rPr>
+              <a:t> Algoritma için SAC :</a:t>
+            </a:r>
+            <a:endParaRPr lang="en-GB" dirty="0"/>
+          </a:p>
+        </p:txBody>
+      </p:sp>
+      <p:sp>
+        <p:nvSpPr>
+          <p:cNvPr id="3" name="Content Placeholder 2">
+            <a:extLst>
+              <a:ext uri="{FF2B5EF4-FFF2-40B4-BE49-F238E27FC236}">
+                <a16:creationId xmlns:a16="http://schemas.microsoft.com/office/drawing/2014/main" id="{EFB5EBAB-9ACA-143B-45F3-15BFDCCC666F}"/>
+              </a:ext>
+            </a:extLst>
+          </p:cNvPr>
+          <p:cNvSpPr>
+            <a:spLocks noGrp="1"/>
+          </p:cNvSpPr>
+          <p:nvPr>
+            <p:ph idx="1"/>
+          </p:nvPr>
+        </p:nvSpPr>
+        <p:spPr>
+          <a:xfrm>
+            <a:off x="838200" y="2766218"/>
+            <a:ext cx="10515600" cy="1325563"/>
+          </a:xfrm>
+        </p:spPr>
+        <p:txBody>
+          <a:bodyPr>
+            <a:normAutofit lnSpcReduction="10000"/>
+          </a:bodyPr>
+          <a:lstStyle/>
+          <a:p>
+            <a:pPr marL="0" indent="0">
+              <a:buNone/>
+            </a:pPr>
+            <a:r>
+              <a:rPr lang="tr-TR" sz="3500" dirty="0">
+                <a:solidFill>
+                  <a:schemeClr val="bg2">
+                    <a:lumMod val="50000"/>
+                  </a:schemeClr>
+                </a:solidFill>
+                <a:latin typeface="Century Gothic" panose="020B0502020202020204" pitchFamily="34" charset="0"/>
+              </a:rPr>
+              <a:t>	</a:t>
+            </a:r>
+            <a:r>
+              <a:rPr lang="tr-TR" sz="2800" dirty="0">
+                <a:latin typeface="Century Gothic" panose="020B0502020202020204" pitchFamily="34" charset="0"/>
+              </a:rPr>
+              <a:t>Politika, sadece maksimum ödülü değil, aynı zamanda entropiyi arttırmayı da hedefler. Bu, ajanların gereksiz yere kararsızlığa düşmesini önler.</a:t>
+            </a:r>
+          </a:p>
+        </p:txBody>
+      </p:sp>
+    </p:spTree>
+    <p:extLst>
+      <p:ext uri="{BB962C8B-B14F-4D97-AF65-F5344CB8AC3E}">
+        <p14:creationId xmlns:p14="http://schemas.microsoft.com/office/powerpoint/2010/main" val="1538237826"/>
+      </p:ext>
+    </p:extLst>
+  </p:cSld>
+  <p:clrMapOvr>
+    <a:masterClrMapping/>
+  </p:clrMapOvr>
+</p:sld>
+</file>
+
+<file path=ppt/slides/slide11.xml><?xml version="1.0" encoding="utf-8"?>
+<p:sld xmlns:a="http://schemas.openxmlformats.org/drawingml/2006/main" xmlns:r="http://schemas.openxmlformats.org/officeDocument/2006/relationships" xmlns:p="http://schemas.openxmlformats.org/presentationml/2006/main">
+  <p:cSld>
+    <p:spTree>
+      <p:nvGrpSpPr>
+        <p:cNvPr id="1" name=""/>
+        <p:cNvGrpSpPr/>
+        <p:nvPr/>
+      </p:nvGrpSpPr>
+      <p:grpSpPr>
+        <a:xfrm>
+          <a:off x="0" y="0"/>
+          <a:ext cx="0" cy="0"/>
+          <a:chOff x="0" y="0"/>
+          <a:chExt cx="0" cy="0"/>
+        </a:xfrm>
+      </p:grpSpPr>
+      <p:sp>
+        <p:nvSpPr>
           <p:cNvPr id="3" name="Content Placeholder 2">
             <a:extLst>
               <a:ext uri="{FF2B5EF4-FFF2-40B4-BE49-F238E27FC236}">
@@ -4061,7 +4193,7 @@
 </p:sld>
 </file>
 
-<file path=ppt/slides/slide11.xml><?xml version="1.0" encoding="utf-8"?>
+<file path=ppt/slides/slide12.xml><?xml version="1.0" encoding="utf-8"?>
 <p:sld xmlns:a="http://schemas.openxmlformats.org/drawingml/2006/main" xmlns:r="http://schemas.openxmlformats.org/officeDocument/2006/relationships" xmlns:p="http://schemas.openxmlformats.org/presentationml/2006/main">
   <p:cSld>
     <p:spTree>
@@ -4160,7 +4292,7 @@
 </p:sld>
 </file>
 
-<file path=ppt/slides/slide12.xml><?xml version="1.0" encoding="utf-8"?>
+<file path=ppt/slides/slide13.xml><?xml version="1.0" encoding="utf-8"?>
 <p:sld xmlns:a="http://schemas.openxmlformats.org/drawingml/2006/main" xmlns:r="http://schemas.openxmlformats.org/officeDocument/2006/relationships" xmlns:p="http://schemas.openxmlformats.org/presentationml/2006/main">
   <p:cSld>
     <p:spTree>
@@ -4265,7 +4397,7 @@
 </p:sld>
 </file>
 
-<file path=ppt/slides/slide13.xml><?xml version="1.0" encoding="utf-8"?>
+<file path=ppt/slides/slide14.xml><?xml version="1.0" encoding="utf-8"?>
 <p:sld xmlns:a="http://schemas.openxmlformats.org/drawingml/2006/main" xmlns:r="http://schemas.openxmlformats.org/officeDocument/2006/relationships" xmlns:p="http://schemas.openxmlformats.org/presentationml/2006/main">
   <p:cSld>
     <p:spTree>
@@ -4411,7 +4543,7 @@
 </p:sld>
 </file>
 
-<file path=ppt/slides/slide14.xml><?xml version="1.0" encoding="utf-8"?>
+<file path=ppt/slides/slide15.xml><?xml version="1.0" encoding="utf-8"?>
 <p:sld xmlns:a="http://schemas.openxmlformats.org/drawingml/2006/main" xmlns:r="http://schemas.openxmlformats.org/officeDocument/2006/relationships" xmlns:p="http://schemas.openxmlformats.org/presentationml/2006/main">
   <p:cSld>
     <p:spTree>
@@ -4691,7 +4823,7 @@
 </p:sld>
 </file>
 
-<file path=ppt/slides/slide15.xml><?xml version="1.0" encoding="utf-8"?>
+<file path=ppt/slides/slide16.xml><?xml version="1.0" encoding="utf-8"?>
 <p:sld xmlns:a="http://schemas.openxmlformats.org/drawingml/2006/main" xmlns:r="http://schemas.openxmlformats.org/officeDocument/2006/relationships" xmlns:p="http://schemas.openxmlformats.org/presentationml/2006/main">
   <p:cSld>
     <p:spTree>
@@ -5239,7 +5371,7 @@
 </p:sld>
 </file>
 
-<file path=ppt/slides/slide16.xml><?xml version="1.0" encoding="utf-8"?>
+<file path=ppt/slides/slide17.xml><?xml version="1.0" encoding="utf-8"?>
 <p:sld xmlns:a="http://schemas.openxmlformats.org/drawingml/2006/main" xmlns:r="http://schemas.openxmlformats.org/officeDocument/2006/relationships" xmlns:p="http://schemas.openxmlformats.org/presentationml/2006/main">
   <p:cSld>
     <p:spTree>
@@ -5344,7 +5476,7 @@
 </p:sld>
 </file>
 
-<file path=ppt/slides/slide17.xml><?xml version="1.0" encoding="utf-8"?>
+<file path=ppt/slides/slide18.xml><?xml version="1.0" encoding="utf-8"?>
 <p:sld xmlns:a="http://schemas.openxmlformats.org/drawingml/2006/main" xmlns:r="http://schemas.openxmlformats.org/officeDocument/2006/relationships" xmlns:p="http://schemas.openxmlformats.org/presentationml/2006/main">
   <p:cSld>
     <p:spTree>
@@ -5449,7 +5581,7 @@
 </p:sld>
 </file>
 
-<file path=ppt/slides/slide18.xml><?xml version="1.0" encoding="utf-8"?>
+<file path=ppt/slides/slide19.xml><?xml version="1.0" encoding="utf-8"?>
 <p:sld xmlns:a="http://schemas.openxmlformats.org/drawingml/2006/main" xmlns:r="http://schemas.openxmlformats.org/officeDocument/2006/relationships" xmlns:p="http://schemas.openxmlformats.org/presentationml/2006/main">
   <p:cSld>
     <p:spTree>
@@ -6062,125 +6194,6 @@
 </p:sld>
 </file>
 
-<file path=ppt/slides/slide19.xml><?xml version="1.0" encoding="utf-8"?>
-<p:sld xmlns:a="http://schemas.openxmlformats.org/drawingml/2006/main" xmlns:r="http://schemas.openxmlformats.org/officeDocument/2006/relationships" xmlns:p="http://schemas.openxmlformats.org/presentationml/2006/main">
-  <p:cSld>
-    <p:spTree>
-      <p:nvGrpSpPr>
-        <p:cNvPr id="1" name=""/>
-        <p:cNvGrpSpPr/>
-        <p:nvPr/>
-      </p:nvGrpSpPr>
-      <p:grpSpPr>
-        <a:xfrm>
-          <a:off x="0" y="0"/>
-          <a:ext cx="0" cy="0"/>
-          <a:chOff x="0" y="0"/>
-          <a:chExt cx="0" cy="0"/>
-        </a:xfrm>
-      </p:grpSpPr>
-      <p:sp>
-        <p:nvSpPr>
-          <p:cNvPr id="2" name="Title 1">
-            <a:extLst>
-              <a:ext uri="{FF2B5EF4-FFF2-40B4-BE49-F238E27FC236}">
-                <a16:creationId xmlns:a16="http://schemas.microsoft.com/office/drawing/2014/main" id="{FC9CC943-DF7B-1F90-2A3A-C32AABB39007}"/>
-              </a:ext>
-            </a:extLst>
-          </p:cNvPr>
-          <p:cNvSpPr>
-            <a:spLocks noGrp="1"/>
-          </p:cNvSpPr>
-          <p:nvPr>
-            <p:ph type="title"/>
-          </p:nvPr>
-        </p:nvSpPr>
-        <p:spPr/>
-        <p:txBody>
-          <a:bodyPr/>
-          <a:lstStyle/>
-          <a:p>
-            <a:r>
-              <a:rPr lang="tr-TR" b="1" dirty="0">
-                <a:latin typeface="Century Gothic" panose="020B0502020202020204" pitchFamily="34" charset="0"/>
-              </a:rPr>
-              <a:t>Mountain Car Problemi</a:t>
-            </a:r>
-            <a:endParaRPr lang="tr-TR" dirty="0"/>
-          </a:p>
-        </p:txBody>
-      </p:sp>
-      <p:sp>
-        <p:nvSpPr>
-          <p:cNvPr id="4" name="Content Placeholder 3">
-            <a:extLst>
-              <a:ext uri="{FF2B5EF4-FFF2-40B4-BE49-F238E27FC236}">
-                <a16:creationId xmlns:a16="http://schemas.microsoft.com/office/drawing/2014/main" id="{6EA57287-D66E-1D21-5324-03ED04977A8B}"/>
-              </a:ext>
-            </a:extLst>
-          </p:cNvPr>
-          <p:cNvSpPr>
-            <a:spLocks noGrp="1"/>
-          </p:cNvSpPr>
-          <p:nvPr>
-            <p:ph idx="1"/>
-          </p:nvPr>
-        </p:nvSpPr>
-        <p:spPr/>
-        <p:txBody>
-          <a:bodyPr>
-            <a:normAutofit/>
-          </a:bodyPr>
-          <a:lstStyle/>
-          <a:p>
-            <a:pPr marL="0" indent="0">
-              <a:buNone/>
-            </a:pPr>
-            <a:r>
-              <a:rPr lang="tr-TR" dirty="0">
-                <a:latin typeface="Century Gothic" panose="020B0502020202020204" pitchFamily="34" charset="0"/>
-              </a:rPr>
-              <a:t>	Mountain Car problemi, bir vadinin içindeki aracı tepeye çıkarma üzerine tasarlanmış bir kontrol problemidir. Temel amaç, aracın gerekli hıza ve güce ulaşarak vadinin sağ tarafındaki tepeye tırmanmasını sağlamaktır. Ancak, aracın motor gücü tek başına bu yükselme için yeterli değildir; bu nedenle araç, vadinin iki yamacı arasında ileri geri hareket ederek momentum kazanmak zorundadır.</a:t>
-            </a:r>
-          </a:p>
-          <a:p>
-            <a:pPr marL="0" indent="0">
-              <a:buNone/>
-            </a:pPr>
-            <a:endParaRPr lang="tr-TR" dirty="0">
-              <a:latin typeface="Century Gothic" panose="020B0502020202020204" pitchFamily="34" charset="0"/>
-            </a:endParaRPr>
-          </a:p>
-          <a:p>
-            <a:pPr marL="0" indent="0">
-              <a:buNone/>
-            </a:pPr>
-            <a:r>
-              <a:rPr lang="tr-TR" dirty="0"/>
-              <a:t>	</a:t>
-            </a:r>
-            <a:endParaRPr lang="tr-TR" dirty="0">
-              <a:latin typeface="Century Gothic" panose="020B0502020202020204" pitchFamily="34" charset="0"/>
-            </a:endParaRPr>
-          </a:p>
-          <a:p>
-            <a:endParaRPr lang="en-GB" dirty="0"/>
-          </a:p>
-        </p:txBody>
-      </p:sp>
-    </p:spTree>
-    <p:extLst>
-      <p:ext uri="{BB962C8B-B14F-4D97-AF65-F5344CB8AC3E}">
-        <p14:creationId xmlns:p14="http://schemas.microsoft.com/office/powerpoint/2010/main" val="589041626"/>
-      </p:ext>
-    </p:extLst>
-  </p:cSld>
-  <p:clrMapOvr>
-    <a:masterClrMapping/>
-  </p:clrMapOvr>
-</p:sld>
-</file>
-
 <file path=ppt/slides/slide2.xml><?xml version="1.0" encoding="utf-8"?>
 <p:sld xmlns:a="http://schemas.openxmlformats.org/drawingml/2006/main" xmlns:r="http://schemas.openxmlformats.org/officeDocument/2006/relationships" xmlns:p="http://schemas.openxmlformats.org/presentationml/2006/main">
   <p:cSld>
@@ -6280,6 +6293,125 @@
           <a:chExt cx="0" cy="0"/>
         </a:xfrm>
       </p:grpSpPr>
+      <p:sp>
+        <p:nvSpPr>
+          <p:cNvPr id="2" name="Title 1">
+            <a:extLst>
+              <a:ext uri="{FF2B5EF4-FFF2-40B4-BE49-F238E27FC236}">
+                <a16:creationId xmlns:a16="http://schemas.microsoft.com/office/drawing/2014/main" id="{FC9CC943-DF7B-1F90-2A3A-C32AABB39007}"/>
+              </a:ext>
+            </a:extLst>
+          </p:cNvPr>
+          <p:cNvSpPr>
+            <a:spLocks noGrp="1"/>
+          </p:cNvSpPr>
+          <p:nvPr>
+            <p:ph type="title"/>
+          </p:nvPr>
+        </p:nvSpPr>
+        <p:spPr/>
+        <p:txBody>
+          <a:bodyPr/>
+          <a:lstStyle/>
+          <a:p>
+            <a:r>
+              <a:rPr lang="tr-TR" b="1" dirty="0">
+                <a:latin typeface="Century Gothic" panose="020B0502020202020204" pitchFamily="34" charset="0"/>
+              </a:rPr>
+              <a:t>Mountain Car Problemi</a:t>
+            </a:r>
+            <a:endParaRPr lang="tr-TR" dirty="0"/>
+          </a:p>
+        </p:txBody>
+      </p:sp>
+      <p:sp>
+        <p:nvSpPr>
+          <p:cNvPr id="4" name="Content Placeholder 3">
+            <a:extLst>
+              <a:ext uri="{FF2B5EF4-FFF2-40B4-BE49-F238E27FC236}">
+                <a16:creationId xmlns:a16="http://schemas.microsoft.com/office/drawing/2014/main" id="{6EA57287-D66E-1D21-5324-03ED04977A8B}"/>
+              </a:ext>
+            </a:extLst>
+          </p:cNvPr>
+          <p:cNvSpPr>
+            <a:spLocks noGrp="1"/>
+          </p:cNvSpPr>
+          <p:nvPr>
+            <p:ph idx="1"/>
+          </p:nvPr>
+        </p:nvSpPr>
+        <p:spPr/>
+        <p:txBody>
+          <a:bodyPr>
+            <a:normAutofit/>
+          </a:bodyPr>
+          <a:lstStyle/>
+          <a:p>
+            <a:pPr marL="0" indent="0">
+              <a:buNone/>
+            </a:pPr>
+            <a:r>
+              <a:rPr lang="tr-TR" dirty="0">
+                <a:latin typeface="Century Gothic" panose="020B0502020202020204" pitchFamily="34" charset="0"/>
+              </a:rPr>
+              <a:t>	Mountain Car problemi, bir vadinin içindeki aracı tepeye çıkarma üzerine tasarlanmış bir kontrol problemidir. Temel amaç, aracın gerekli hıza ve güce ulaşarak vadinin sağ tarafındaki tepeye tırmanmasını sağlamaktır. Ancak, aracın motor gücü tek başına bu yükselme için yeterli değildir; bu nedenle araç, vadinin iki yamacı arasında ileri geri hareket ederek momentum kazanmak zorundadır.</a:t>
+            </a:r>
+          </a:p>
+          <a:p>
+            <a:pPr marL="0" indent="0">
+              <a:buNone/>
+            </a:pPr>
+            <a:endParaRPr lang="tr-TR" dirty="0">
+              <a:latin typeface="Century Gothic" panose="020B0502020202020204" pitchFamily="34" charset="0"/>
+            </a:endParaRPr>
+          </a:p>
+          <a:p>
+            <a:pPr marL="0" indent="0">
+              <a:buNone/>
+            </a:pPr>
+            <a:r>
+              <a:rPr lang="tr-TR" dirty="0"/>
+              <a:t>	</a:t>
+            </a:r>
+            <a:endParaRPr lang="tr-TR" dirty="0">
+              <a:latin typeface="Century Gothic" panose="020B0502020202020204" pitchFamily="34" charset="0"/>
+            </a:endParaRPr>
+          </a:p>
+          <a:p>
+            <a:endParaRPr lang="en-GB" dirty="0"/>
+          </a:p>
+        </p:txBody>
+      </p:sp>
+    </p:spTree>
+    <p:extLst>
+      <p:ext uri="{BB962C8B-B14F-4D97-AF65-F5344CB8AC3E}">
+        <p14:creationId xmlns:p14="http://schemas.microsoft.com/office/powerpoint/2010/main" val="589041626"/>
+      </p:ext>
+    </p:extLst>
+  </p:cSld>
+  <p:clrMapOvr>
+    <a:masterClrMapping/>
+  </p:clrMapOvr>
+</p:sld>
+</file>
+
+<file path=ppt/slides/slide21.xml><?xml version="1.0" encoding="utf-8"?>
+<p:sld xmlns:a="http://schemas.openxmlformats.org/drawingml/2006/main" xmlns:r="http://schemas.openxmlformats.org/officeDocument/2006/relationships" xmlns:p="http://schemas.openxmlformats.org/presentationml/2006/main">
+  <p:cSld>
+    <p:spTree>
+      <p:nvGrpSpPr>
+        <p:cNvPr id="1" name=""/>
+        <p:cNvGrpSpPr/>
+        <p:nvPr/>
+      </p:nvGrpSpPr>
+      <p:grpSpPr>
+        <a:xfrm>
+          <a:off x="0" y="0"/>
+          <a:ext cx="0" cy="0"/>
+          <a:chOff x="0" y="0"/>
+          <a:chExt cx="0" cy="0"/>
+        </a:xfrm>
+      </p:grpSpPr>
       <p:pic>
         <p:nvPicPr>
           <p:cNvPr id="5" name="Content Placeholder 4" descr="A black and white image of a train">
@@ -7221,7 +7353,7 @@
 </p:sld>
 </file>
 
-<file path=ppt/slides/slide21.xml><?xml version="1.0" encoding="utf-8"?>
+<file path=ppt/slides/slide22.xml><?xml version="1.0" encoding="utf-8"?>
 <p:sld xmlns:a="http://schemas.openxmlformats.org/drawingml/2006/main" xmlns:r="http://schemas.openxmlformats.org/officeDocument/2006/relationships" xmlns:p="http://schemas.openxmlformats.org/presentationml/2006/main">
   <p:cSld>
     <p:spTree>
@@ -7622,25 +7754,13 @@
               <a:rPr lang="en-GB" dirty="0">
                 <a:latin typeface="Century Gothic" panose="020B0502020202020204" pitchFamily="34" charset="0"/>
               </a:rPr>
-              <a:t>: sol </a:t>
-            </a:r>
-            <a:r>
-              <a:rPr lang="en-GB" dirty="0" err="1">
-                <a:latin typeface="Century Gothic" panose="020B0502020202020204" pitchFamily="34" charset="0"/>
-              </a:rPr>
-              <a:t>ve</a:t>
-            </a:r>
-            <a:r>
-              <a:rPr lang="en-GB" dirty="0">
-                <a:latin typeface="Century Gothic" panose="020B0502020202020204" pitchFamily="34" charset="0"/>
-              </a:rPr>
-              <a:t> </a:t>
-            </a:r>
-            <a:r>
-              <a:rPr lang="en-GB" dirty="0" err="1">
-                <a:latin typeface="Century Gothic" panose="020B0502020202020204" pitchFamily="34" charset="0"/>
-              </a:rPr>
-              <a:t>sağ</a:t>
+              <a:t>: </a:t>
+            </a:r>
+            <a:r>
+              <a:rPr lang="tr-TR" dirty="0">
+                <a:latin typeface="Century Gothic" panose="020B0502020202020204" pitchFamily="34" charset="0"/>
+              </a:rPr>
+              <a:t>ileri ve geri</a:t>
             </a:r>
             <a:r>
               <a:rPr lang="en-GB" dirty="0">
@@ -7664,7 +7784,7 @@
 </p:sld>
 </file>
 
-<file path=ppt/slides/slide22.xml><?xml version="1.0" encoding="utf-8"?>
+<file path=ppt/slides/slide23.xml><?xml version="1.0" encoding="utf-8"?>
 <p:sld xmlns:a="http://schemas.openxmlformats.org/drawingml/2006/main" xmlns:r="http://schemas.openxmlformats.org/officeDocument/2006/relationships" xmlns:p="http://schemas.openxmlformats.org/presentationml/2006/main">
   <p:cSld>
     <p:spTree>
@@ -8216,7 +8336,7 @@
 </p:sld>
 </file>
 
-<file path=ppt/slides/slide23.xml><?xml version="1.0" encoding="utf-8"?>
+<file path=ppt/slides/slide24.xml><?xml version="1.0" encoding="utf-8"?>
 <p:sld xmlns:a="http://schemas.openxmlformats.org/drawingml/2006/main" xmlns:r="http://schemas.openxmlformats.org/officeDocument/2006/relationships" xmlns:p="http://schemas.openxmlformats.org/presentationml/2006/main">
   <p:cSld>
     <p:spTree>
@@ -8458,7 +8578,7 @@
 </p:sld>
 </file>
 
-<file path=ppt/slides/slide24.xml><?xml version="1.0" encoding="utf-8"?>
+<file path=ppt/slides/slide25.xml><?xml version="1.0" encoding="utf-8"?>
 <p:sld xmlns:a="http://schemas.openxmlformats.org/drawingml/2006/main" xmlns:r="http://schemas.openxmlformats.org/officeDocument/2006/relationships" xmlns:p="http://schemas.openxmlformats.org/presentationml/2006/main">
   <p:cSld>
     <p:spTree>
@@ -9066,7 +9186,7 @@
               <a:rPr lang="tr-TR" sz="2000" dirty="0">
                 <a:latin typeface="Century Gothic" panose="020B0502020202020204" pitchFamily="34" charset="0"/>
               </a:rPr>
-              <a:t> Direksiyonu Sağa </a:t>
+              <a:t> Direksiyonu sağa </a:t>
             </a:r>
             <a:r>
               <a:rPr lang="en-GB" sz="2000" dirty="0">
@@ -9602,7 +9722,7 @@
 </p:sld>
 </file>
 
-<file path=ppt/slides/slide25.xml><?xml version="1.0" encoding="utf-8"?>
+<file path=ppt/slides/slide26.xml><?xml version="1.0" encoding="utf-8"?>
 <p:sld xmlns:a="http://schemas.openxmlformats.org/drawingml/2006/main" xmlns:r="http://schemas.openxmlformats.org/officeDocument/2006/relationships" xmlns:p="http://schemas.openxmlformats.org/presentationml/2006/main">
   <p:cSld>
     <p:spTree>
@@ -10943,7 +11063,7 @@
 </p:sld>
 </file>
 
-<file path=ppt/slides/slide26.xml><?xml version="1.0" encoding="utf-8"?>
+<file path=ppt/slides/slide27.xml><?xml version="1.0" encoding="utf-8"?>
 <p:sld xmlns:a="http://schemas.openxmlformats.org/drawingml/2006/main" xmlns:r="http://schemas.openxmlformats.org/officeDocument/2006/relationships" xmlns:p="http://schemas.openxmlformats.org/presentationml/2006/main">
   <p:cSld>
     <p:spTree>
@@ -11680,7 +11800,1105 @@
 </p:sld>
 </file>
 
+<file path=ppt/slides/slide28.xml><?xml version="1.0" encoding="utf-8"?>
+<p:sld xmlns:a="http://schemas.openxmlformats.org/drawingml/2006/main" xmlns:r="http://schemas.openxmlformats.org/officeDocument/2006/relationships" xmlns:p="http://schemas.openxmlformats.org/presentationml/2006/main">
+  <p:cSld>
+    <p:spTree>
+      <p:nvGrpSpPr>
+        <p:cNvPr id="1" name=""/>
+        <p:cNvGrpSpPr/>
+        <p:nvPr/>
+      </p:nvGrpSpPr>
+      <p:grpSpPr>
+        <a:xfrm>
+          <a:off x="0" y="0"/>
+          <a:ext cx="0" cy="0"/>
+          <a:chOff x="0" y="0"/>
+          <a:chExt cx="0" cy="0"/>
+        </a:xfrm>
+      </p:grpSpPr>
+      <p:sp>
+        <p:nvSpPr>
+          <p:cNvPr id="3" name="Content Placeholder 2">
+            <a:extLst>
+              <a:ext uri="{FF2B5EF4-FFF2-40B4-BE49-F238E27FC236}">
+                <a16:creationId xmlns:a16="http://schemas.microsoft.com/office/drawing/2014/main" id="{61119E07-987C-90B6-699D-CA898A35C299}"/>
+              </a:ext>
+            </a:extLst>
+          </p:cNvPr>
+          <p:cNvSpPr>
+            <a:spLocks noGrp="1"/>
+          </p:cNvSpPr>
+          <p:nvPr>
+            <p:ph idx="1"/>
+          </p:nvPr>
+        </p:nvSpPr>
+        <p:spPr>
+          <a:xfrm>
+            <a:off x="838200" y="3086669"/>
+            <a:ext cx="10515600" cy="684662"/>
+          </a:xfrm>
+        </p:spPr>
+        <p:txBody>
+          <a:bodyPr>
+            <a:normAutofit fontScale="92500" lnSpcReduction="10000"/>
+          </a:bodyPr>
+          <a:lstStyle/>
+          <a:p>
+            <a:pPr marL="0" indent="0" algn="ctr">
+              <a:buNone/>
+            </a:pPr>
+            <a:r>
+              <a:rPr lang="en-GB" sz="5000" b="1" dirty="0"/>
+              <a:t>T</a:t>
+            </a:r>
+            <a:r>
+              <a:rPr lang="tr-TR" sz="5000" b="1" dirty="0" err="1"/>
+              <a:t>eşekkürler</a:t>
+            </a:r>
+            <a:endParaRPr lang="en-GB" sz="5000" b="1" dirty="0"/>
+          </a:p>
+        </p:txBody>
+      </p:sp>
+    </p:spTree>
+    <p:extLst>
+      <p:ext uri="{BB962C8B-B14F-4D97-AF65-F5344CB8AC3E}">
+        <p14:creationId xmlns:p14="http://schemas.microsoft.com/office/powerpoint/2010/main" val="1646927093"/>
+      </p:ext>
+    </p:extLst>
+  </p:cSld>
+  <p:clrMapOvr>
+    <a:masterClrMapping/>
+  </p:clrMapOvr>
+</p:sld>
+</file>
+
 <file path=ppt/slides/slide3.xml><?xml version="1.0" encoding="utf-8"?>
+<p:sld xmlns:a="http://schemas.openxmlformats.org/drawingml/2006/main" xmlns:r="http://schemas.openxmlformats.org/officeDocument/2006/relationships" xmlns:p="http://schemas.openxmlformats.org/presentationml/2006/main">
+  <p:cSld>
+    <p:spTree>
+      <p:nvGrpSpPr>
+        <p:cNvPr id="1" name=""/>
+        <p:cNvGrpSpPr/>
+        <p:nvPr/>
+      </p:nvGrpSpPr>
+      <p:grpSpPr>
+        <a:xfrm>
+          <a:off x="0" y="0"/>
+          <a:ext cx="0" cy="0"/>
+          <a:chOff x="0" y="0"/>
+          <a:chExt cx="0" cy="0"/>
+        </a:xfrm>
+      </p:grpSpPr>
+      <p:sp>
+        <p:nvSpPr>
+          <p:cNvPr id="2" name="Title 1">
+            <a:extLst>
+              <a:ext uri="{FF2B5EF4-FFF2-40B4-BE49-F238E27FC236}">
+                <a16:creationId xmlns:a16="http://schemas.microsoft.com/office/drawing/2014/main" id="{92CD2352-E5BD-8BA8-4EA4-99007774D9B1}"/>
+              </a:ext>
+            </a:extLst>
+          </p:cNvPr>
+          <p:cNvSpPr>
+            <a:spLocks noGrp="1"/>
+          </p:cNvSpPr>
+          <p:nvPr>
+            <p:ph type="title"/>
+          </p:nvPr>
+        </p:nvSpPr>
+        <p:spPr/>
+        <p:txBody>
+          <a:bodyPr/>
+          <a:lstStyle/>
+          <a:p>
+            <a:r>
+              <a:rPr lang="en-GB" b="1" dirty="0" err="1">
+                <a:latin typeface="Century Gothic" panose="020B0502020202020204" pitchFamily="34" charset="0"/>
+              </a:rPr>
+              <a:t>Genelleştirilmiş</a:t>
+            </a:r>
+            <a:r>
+              <a:rPr lang="en-GB" b="1" dirty="0">
+                <a:latin typeface="Century Gothic" panose="020B0502020202020204" pitchFamily="34" charset="0"/>
+              </a:rPr>
+              <a:t> </a:t>
+            </a:r>
+            <a:r>
+              <a:rPr lang="en-GB" b="1" dirty="0" err="1">
+                <a:latin typeface="Century Gothic" panose="020B0502020202020204" pitchFamily="34" charset="0"/>
+              </a:rPr>
+              <a:t>Avantaj</a:t>
+            </a:r>
+            <a:r>
+              <a:rPr lang="en-GB" b="1" dirty="0">
+                <a:latin typeface="Century Gothic" panose="020B0502020202020204" pitchFamily="34" charset="0"/>
+              </a:rPr>
+              <a:t> </a:t>
+            </a:r>
+            <a:r>
+              <a:rPr lang="en-GB" b="1" dirty="0" err="1">
+                <a:latin typeface="Century Gothic" panose="020B0502020202020204" pitchFamily="34" charset="0"/>
+              </a:rPr>
+              <a:t>Tahmini</a:t>
+            </a:r>
+            <a:r>
+              <a:rPr lang="en-GB" b="1" dirty="0">
+                <a:latin typeface="Century Gothic" panose="020B0502020202020204" pitchFamily="34" charset="0"/>
+              </a:rPr>
+              <a:t> (GAE)</a:t>
+            </a:r>
+          </a:p>
+        </p:txBody>
+      </p:sp>
+      <p:sp>
+        <p:nvSpPr>
+          <p:cNvPr id="4" name="Rectangle 1">
+            <a:extLst>
+              <a:ext uri="{FF2B5EF4-FFF2-40B4-BE49-F238E27FC236}">
+                <a16:creationId xmlns:a16="http://schemas.microsoft.com/office/drawing/2014/main" id="{23CD6E79-C020-757D-D1BC-527DE652CFB4}"/>
+              </a:ext>
+            </a:extLst>
+          </p:cNvPr>
+          <p:cNvSpPr>
+            <a:spLocks noGrp="1" noChangeArrowheads="1"/>
+          </p:cNvSpPr>
+          <p:nvPr>
+            <p:ph idx="1"/>
+          </p:nvPr>
+        </p:nvSpPr>
+        <p:spPr bwMode="auto">
+          <a:xfrm>
+            <a:off x="838200" y="1690688"/>
+            <a:ext cx="9993012" cy="3108543"/>
+          </a:xfrm>
+          <a:prstGeom prst="rect">
+            <a:avLst/>
+          </a:prstGeom>
+          <a:noFill/>
+          <a:ln>
+            <a:noFill/>
+          </a:ln>
+          <a:effectLst/>
+          <a:extLst>
+            <a:ext uri="{909E8E84-426E-40DD-AFC4-6F175D3DCCD1}">
+              <a14:hiddenFill xmlns:a14="http://schemas.microsoft.com/office/drawing/2010/main">
+                <a:solidFill>
+                  <a:schemeClr val="accent1"/>
+                </a:solidFill>
+              </a14:hiddenFill>
+            </a:ext>
+            <a:ext uri="{91240B29-F687-4F45-9708-019B960494DF}">
+              <a14:hiddenLine xmlns:a14="http://schemas.microsoft.com/office/drawing/2010/main" w="9525">
+                <a:solidFill>
+                  <a:schemeClr val="tx1"/>
+                </a:solidFill>
+                <a:miter lim="800000"/>
+                <a:headEnd/>
+                <a:tailEnd/>
+              </a14:hiddenLine>
+            </a:ext>
+            <a:ext uri="{AF507438-7753-43E0-B8FC-AC1667EBCBE1}">
+              <a14:hiddenEffects xmlns:a14="http://schemas.microsoft.com/office/drawing/2010/main">
+                <a:effectLst>
+                  <a:outerShdw dist="35921" dir="2700000" algn="ctr" rotWithShape="0">
+                    <a:schemeClr val="bg2"/>
+                  </a:outerShdw>
+                </a:effectLst>
+              </a14:hiddenEffects>
+            </a:ext>
+          </a:extLst>
+        </p:spPr>
+        <p:txBody>
+          <a:bodyPr vert="horz" wrap="square" lIns="91440" tIns="45720" rIns="91440" bIns="45720" numCol="1" anchor="ctr" anchorCtr="0" compatLnSpc="1">
+            <a:prstTxWarp prst="textNoShape">
+              <a:avLst/>
+            </a:prstTxWarp>
+            <a:spAutoFit/>
+          </a:bodyPr>
+          <a:lstStyle/>
+          <a:p>
+            <a:pPr marL="0" marR="0" lvl="0" indent="0" algn="l" defTabSz="914400" rtl="0" eaLnBrk="0" fontAlgn="base" latinLnBrk="0" hangingPunct="0">
+              <a:lnSpc>
+                <a:spcPct val="100000"/>
+              </a:lnSpc>
+              <a:spcBef>
+                <a:spcPct val="0"/>
+              </a:spcBef>
+              <a:spcAft>
+                <a:spcPct val="0"/>
+              </a:spcAft>
+              <a:buClrTx/>
+              <a:buSzTx/>
+              <a:buFontTx/>
+              <a:buNone/>
+              <a:tabLst/>
+            </a:pPr>
+            <a:r>
+              <a:rPr kumimoji="0" lang="en-US" altLang="en-US" b="0" i="0" u="none" strike="noStrike" cap="none" normalizeH="0" baseline="0" dirty="0">
+                <a:ln>
+                  <a:noFill/>
+                </a:ln>
+                <a:solidFill>
+                  <a:schemeClr val="tx1"/>
+                </a:solidFill>
+                <a:effectLst/>
+                <a:latin typeface="Century Gothic" panose="020B0502020202020204" pitchFamily="34" charset="0"/>
+              </a:rPr>
+              <a:t>GAE (</a:t>
+            </a:r>
+            <a:r>
+              <a:rPr kumimoji="0" lang="en-US" altLang="en-US" b="0" i="0" u="none" strike="noStrike" cap="none" normalizeH="0" baseline="0" dirty="0" err="1">
+                <a:ln>
+                  <a:noFill/>
+                </a:ln>
+                <a:solidFill>
+                  <a:schemeClr val="tx1"/>
+                </a:solidFill>
+                <a:effectLst/>
+                <a:latin typeface="Century Gothic" panose="020B0502020202020204" pitchFamily="34" charset="0"/>
+              </a:rPr>
+              <a:t>Genelleştirilmiş</a:t>
+            </a:r>
+            <a:r>
+              <a:rPr kumimoji="0" lang="en-US" altLang="en-US" b="0" i="0" u="none" strike="noStrike" cap="none" normalizeH="0" baseline="0" dirty="0">
+                <a:ln>
+                  <a:noFill/>
+                </a:ln>
+                <a:solidFill>
+                  <a:schemeClr val="tx1"/>
+                </a:solidFill>
+                <a:effectLst/>
+                <a:latin typeface="Century Gothic" panose="020B0502020202020204" pitchFamily="34" charset="0"/>
+              </a:rPr>
+              <a:t> </a:t>
+            </a:r>
+            <a:r>
+              <a:rPr kumimoji="0" lang="en-US" altLang="en-US" b="0" i="0" u="none" strike="noStrike" cap="none" normalizeH="0" baseline="0" dirty="0" err="1">
+                <a:ln>
+                  <a:noFill/>
+                </a:ln>
+                <a:solidFill>
+                  <a:schemeClr val="tx1"/>
+                </a:solidFill>
+                <a:effectLst/>
+                <a:latin typeface="Century Gothic" panose="020B0502020202020204" pitchFamily="34" charset="0"/>
+              </a:rPr>
+              <a:t>Avantaj</a:t>
+            </a:r>
+            <a:r>
+              <a:rPr kumimoji="0" lang="en-US" altLang="en-US" b="0" i="0" u="none" strike="noStrike" cap="none" normalizeH="0" baseline="0" dirty="0">
+                <a:ln>
+                  <a:noFill/>
+                </a:ln>
+                <a:solidFill>
+                  <a:schemeClr val="tx1"/>
+                </a:solidFill>
+                <a:effectLst/>
+                <a:latin typeface="Century Gothic" panose="020B0502020202020204" pitchFamily="34" charset="0"/>
+              </a:rPr>
+              <a:t> </a:t>
+            </a:r>
+            <a:r>
+              <a:rPr kumimoji="0" lang="en-US" altLang="en-US" b="0" i="0" u="none" strike="noStrike" cap="none" normalizeH="0" baseline="0" dirty="0" err="1">
+                <a:ln>
+                  <a:noFill/>
+                </a:ln>
+                <a:solidFill>
+                  <a:schemeClr val="tx1"/>
+                </a:solidFill>
+                <a:effectLst/>
+                <a:latin typeface="Century Gothic" panose="020B0502020202020204" pitchFamily="34" charset="0"/>
+              </a:rPr>
+              <a:t>Tahmini</a:t>
+            </a:r>
+            <a:r>
+              <a:rPr kumimoji="0" lang="en-US" altLang="en-US" b="0" i="0" u="none" strike="noStrike" cap="none" normalizeH="0" baseline="0" dirty="0">
+                <a:ln>
+                  <a:noFill/>
+                </a:ln>
+                <a:solidFill>
+                  <a:schemeClr val="tx1"/>
+                </a:solidFill>
+                <a:effectLst/>
+                <a:latin typeface="Century Gothic" panose="020B0502020202020204" pitchFamily="34" charset="0"/>
+              </a:rPr>
+              <a:t>), </a:t>
+            </a:r>
+            <a:r>
+              <a:rPr kumimoji="0" lang="en-US" altLang="en-US" b="0" i="0" u="none" strike="noStrike" cap="none" normalizeH="0" baseline="0" dirty="0" err="1">
+                <a:ln>
+                  <a:noFill/>
+                </a:ln>
+                <a:solidFill>
+                  <a:schemeClr val="tx1"/>
+                </a:solidFill>
+                <a:effectLst/>
+                <a:latin typeface="Century Gothic" panose="020B0502020202020204" pitchFamily="34" charset="0"/>
+              </a:rPr>
+              <a:t>robotikte</a:t>
+            </a:r>
+            <a:r>
+              <a:rPr kumimoji="0" lang="en-US" altLang="en-US" b="0" i="0" u="none" strike="noStrike" cap="none" normalizeH="0" baseline="0" dirty="0">
+                <a:ln>
+                  <a:noFill/>
+                </a:ln>
+                <a:solidFill>
+                  <a:schemeClr val="tx1"/>
+                </a:solidFill>
+                <a:effectLst/>
+                <a:latin typeface="Century Gothic" panose="020B0502020202020204" pitchFamily="34" charset="0"/>
+              </a:rPr>
+              <a:t> </a:t>
+            </a:r>
+            <a:r>
+              <a:rPr kumimoji="0" lang="en-US" altLang="en-US" b="0" i="0" u="none" strike="noStrike" cap="none" normalizeH="0" baseline="0" dirty="0" err="1">
+                <a:ln>
+                  <a:noFill/>
+                </a:ln>
+                <a:solidFill>
+                  <a:schemeClr val="tx1"/>
+                </a:solidFill>
+                <a:effectLst/>
+                <a:latin typeface="Century Gothic" panose="020B0502020202020204" pitchFamily="34" charset="0"/>
+              </a:rPr>
+              <a:t>pekiştirmeli</a:t>
+            </a:r>
+            <a:r>
+              <a:rPr kumimoji="0" lang="en-US" altLang="en-US" b="0" i="0" u="none" strike="noStrike" cap="none" normalizeH="0" baseline="0" dirty="0">
+                <a:ln>
+                  <a:noFill/>
+                </a:ln>
+                <a:solidFill>
+                  <a:schemeClr val="tx1"/>
+                </a:solidFill>
+                <a:effectLst/>
+                <a:latin typeface="Century Gothic" panose="020B0502020202020204" pitchFamily="34" charset="0"/>
+              </a:rPr>
+              <a:t> </a:t>
+            </a:r>
+            <a:r>
+              <a:rPr kumimoji="0" lang="en-US" altLang="en-US" b="0" i="0" u="none" strike="noStrike" cap="none" normalizeH="0" baseline="0" dirty="0" err="1">
+                <a:ln>
+                  <a:noFill/>
+                </a:ln>
+                <a:solidFill>
+                  <a:schemeClr val="tx1"/>
+                </a:solidFill>
+                <a:effectLst/>
+                <a:latin typeface="Century Gothic" panose="020B0502020202020204" pitchFamily="34" charset="0"/>
+              </a:rPr>
+              <a:t>öğrenme</a:t>
+            </a:r>
+            <a:r>
+              <a:rPr kumimoji="0" lang="en-US" altLang="en-US" b="0" i="0" u="none" strike="noStrike" cap="none" normalizeH="0" baseline="0" dirty="0">
+                <a:ln>
+                  <a:noFill/>
+                </a:ln>
+                <a:solidFill>
+                  <a:schemeClr val="tx1"/>
+                </a:solidFill>
+                <a:effectLst/>
+                <a:latin typeface="Century Gothic" panose="020B0502020202020204" pitchFamily="34" charset="0"/>
+              </a:rPr>
+              <a:t> </a:t>
+            </a:r>
+            <a:r>
+              <a:rPr kumimoji="0" lang="en-US" altLang="en-US" b="0" i="0" u="none" strike="noStrike" cap="none" normalizeH="0" baseline="0" dirty="0" err="1">
+                <a:ln>
+                  <a:noFill/>
+                </a:ln>
+                <a:solidFill>
+                  <a:schemeClr val="tx1"/>
+                </a:solidFill>
+                <a:effectLst/>
+                <a:latin typeface="Century Gothic" panose="020B0502020202020204" pitchFamily="34" charset="0"/>
+              </a:rPr>
+              <a:t>algoritmalarında</a:t>
+            </a:r>
+            <a:r>
+              <a:rPr kumimoji="0" lang="en-US" altLang="en-US" b="0" i="0" u="none" strike="noStrike" cap="none" normalizeH="0" baseline="0" dirty="0">
+                <a:ln>
+                  <a:noFill/>
+                </a:ln>
+                <a:solidFill>
+                  <a:schemeClr val="tx1"/>
+                </a:solidFill>
+                <a:effectLst/>
+                <a:latin typeface="Century Gothic" panose="020B0502020202020204" pitchFamily="34" charset="0"/>
+              </a:rPr>
+              <a:t>, </a:t>
+            </a:r>
+            <a:r>
+              <a:rPr kumimoji="0" lang="en-US" altLang="en-US" b="0" i="0" u="none" strike="noStrike" cap="none" normalizeH="0" baseline="0" dirty="0" err="1">
+                <a:ln>
+                  <a:noFill/>
+                </a:ln>
+                <a:solidFill>
+                  <a:schemeClr val="tx1"/>
+                </a:solidFill>
+                <a:effectLst/>
+                <a:latin typeface="Century Gothic" panose="020B0502020202020204" pitchFamily="34" charset="0"/>
+              </a:rPr>
+              <a:t>bir</a:t>
+            </a:r>
+            <a:r>
+              <a:rPr kumimoji="0" lang="en-US" altLang="en-US" b="0" i="0" u="none" strike="noStrike" cap="none" normalizeH="0" baseline="0" dirty="0">
+                <a:ln>
+                  <a:noFill/>
+                </a:ln>
+                <a:solidFill>
+                  <a:schemeClr val="tx1"/>
+                </a:solidFill>
+                <a:effectLst/>
+                <a:latin typeface="Century Gothic" panose="020B0502020202020204" pitchFamily="34" charset="0"/>
+              </a:rPr>
+              <a:t> </a:t>
+            </a:r>
+            <a:r>
+              <a:rPr kumimoji="0" lang="en-US" altLang="en-US" b="0" i="0" u="none" strike="noStrike" cap="none" normalizeH="0" baseline="0" dirty="0" err="1">
+                <a:ln>
+                  <a:noFill/>
+                </a:ln>
+                <a:solidFill>
+                  <a:schemeClr val="tx1"/>
+                </a:solidFill>
+                <a:effectLst/>
+                <a:latin typeface="Century Gothic" panose="020B0502020202020204" pitchFamily="34" charset="0"/>
+              </a:rPr>
+              <a:t>eylemin</a:t>
+            </a:r>
+            <a:r>
+              <a:rPr kumimoji="0" lang="en-US" altLang="en-US" b="0" i="0" u="none" strike="noStrike" cap="none" normalizeH="0" baseline="0" dirty="0">
+                <a:ln>
+                  <a:noFill/>
+                </a:ln>
+                <a:solidFill>
+                  <a:schemeClr val="tx1"/>
+                </a:solidFill>
+                <a:effectLst/>
+                <a:latin typeface="Century Gothic" panose="020B0502020202020204" pitchFamily="34" charset="0"/>
+              </a:rPr>
+              <a:t> ne </a:t>
+            </a:r>
+            <a:r>
+              <a:rPr kumimoji="0" lang="en-US" altLang="en-US" b="0" i="0" u="none" strike="noStrike" cap="none" normalizeH="0" baseline="0" dirty="0" err="1">
+                <a:ln>
+                  <a:noFill/>
+                </a:ln>
+                <a:solidFill>
+                  <a:schemeClr val="tx1"/>
+                </a:solidFill>
+                <a:effectLst/>
+                <a:latin typeface="Century Gothic" panose="020B0502020202020204" pitchFamily="34" charset="0"/>
+              </a:rPr>
+              <a:t>kadar</a:t>
+            </a:r>
+            <a:r>
+              <a:rPr kumimoji="0" lang="en-US" altLang="en-US" b="0" i="0" u="none" strike="noStrike" cap="none" normalizeH="0" baseline="0" dirty="0">
+                <a:ln>
+                  <a:noFill/>
+                </a:ln>
+                <a:solidFill>
+                  <a:schemeClr val="tx1"/>
+                </a:solidFill>
+                <a:effectLst/>
+                <a:latin typeface="Century Gothic" panose="020B0502020202020204" pitchFamily="34" charset="0"/>
+              </a:rPr>
+              <a:t> </a:t>
+            </a:r>
+            <a:r>
+              <a:rPr kumimoji="0" lang="en-US" altLang="en-US" b="0" i="0" u="none" strike="noStrike" cap="none" normalizeH="0" baseline="0" dirty="0" err="1">
+                <a:ln>
+                  <a:noFill/>
+                </a:ln>
+                <a:solidFill>
+                  <a:schemeClr val="tx1"/>
+                </a:solidFill>
+                <a:effectLst/>
+                <a:latin typeface="Century Gothic" panose="020B0502020202020204" pitchFamily="34" charset="0"/>
+              </a:rPr>
+              <a:t>avantajlı</a:t>
+            </a:r>
+            <a:r>
+              <a:rPr kumimoji="0" lang="en-US" altLang="en-US" b="0" i="0" u="none" strike="noStrike" cap="none" normalizeH="0" baseline="0" dirty="0">
+                <a:ln>
+                  <a:noFill/>
+                </a:ln>
+                <a:solidFill>
+                  <a:schemeClr val="tx1"/>
+                </a:solidFill>
+                <a:effectLst/>
+                <a:latin typeface="Century Gothic" panose="020B0502020202020204" pitchFamily="34" charset="0"/>
+              </a:rPr>
+              <a:t> </a:t>
+            </a:r>
+            <a:r>
+              <a:rPr kumimoji="0" lang="en-US" altLang="en-US" b="0" i="0" u="none" strike="noStrike" cap="none" normalizeH="0" baseline="0" dirty="0" err="1">
+                <a:ln>
+                  <a:noFill/>
+                </a:ln>
+                <a:solidFill>
+                  <a:schemeClr val="tx1"/>
+                </a:solidFill>
+                <a:effectLst/>
+                <a:latin typeface="Century Gothic" panose="020B0502020202020204" pitchFamily="34" charset="0"/>
+              </a:rPr>
+              <a:t>olduğunu</a:t>
+            </a:r>
+            <a:r>
+              <a:rPr kumimoji="0" lang="en-US" altLang="en-US" b="0" i="0" u="none" strike="noStrike" cap="none" normalizeH="0" baseline="0" dirty="0">
+                <a:ln>
+                  <a:noFill/>
+                </a:ln>
+                <a:solidFill>
+                  <a:schemeClr val="tx1"/>
+                </a:solidFill>
+                <a:effectLst/>
+                <a:latin typeface="Century Gothic" panose="020B0502020202020204" pitchFamily="34" charset="0"/>
+              </a:rPr>
+              <a:t> </a:t>
+            </a:r>
+            <a:r>
+              <a:rPr kumimoji="0" lang="en-US" altLang="en-US" b="0" i="0" u="none" strike="noStrike" cap="none" normalizeH="0" baseline="0" dirty="0" err="1">
+                <a:ln>
+                  <a:noFill/>
+                </a:ln>
+                <a:solidFill>
+                  <a:schemeClr val="tx1"/>
+                </a:solidFill>
+                <a:effectLst/>
+                <a:latin typeface="Century Gothic" panose="020B0502020202020204" pitchFamily="34" charset="0"/>
+              </a:rPr>
+              <a:t>daha</a:t>
+            </a:r>
+            <a:r>
+              <a:rPr kumimoji="0" lang="en-US" altLang="en-US" b="0" i="0" u="none" strike="noStrike" cap="none" normalizeH="0" baseline="0" dirty="0">
+                <a:ln>
+                  <a:noFill/>
+                </a:ln>
+                <a:solidFill>
+                  <a:schemeClr val="tx1"/>
+                </a:solidFill>
+                <a:effectLst/>
+                <a:latin typeface="Century Gothic" panose="020B0502020202020204" pitchFamily="34" charset="0"/>
+              </a:rPr>
+              <a:t> </a:t>
+            </a:r>
+            <a:r>
+              <a:rPr kumimoji="0" lang="en-US" altLang="en-US" b="0" i="0" u="none" strike="noStrike" cap="none" normalizeH="0" baseline="0" dirty="0" err="1">
+                <a:ln>
+                  <a:noFill/>
+                </a:ln>
+                <a:solidFill>
+                  <a:schemeClr val="tx1"/>
+                </a:solidFill>
+                <a:effectLst/>
+                <a:latin typeface="Century Gothic" panose="020B0502020202020204" pitchFamily="34" charset="0"/>
+              </a:rPr>
+              <a:t>doğru</a:t>
+            </a:r>
+            <a:r>
+              <a:rPr kumimoji="0" lang="en-US" altLang="en-US" b="0" i="0" u="none" strike="noStrike" cap="none" normalizeH="0" baseline="0" dirty="0">
+                <a:ln>
+                  <a:noFill/>
+                </a:ln>
+                <a:solidFill>
+                  <a:schemeClr val="tx1"/>
+                </a:solidFill>
+                <a:effectLst/>
+                <a:latin typeface="Century Gothic" panose="020B0502020202020204" pitchFamily="34" charset="0"/>
+              </a:rPr>
+              <a:t> </a:t>
+            </a:r>
+            <a:r>
+              <a:rPr kumimoji="0" lang="en-US" altLang="en-US" b="0" i="0" u="none" strike="noStrike" cap="none" normalizeH="0" baseline="0" dirty="0" err="1">
+                <a:ln>
+                  <a:noFill/>
+                </a:ln>
+                <a:solidFill>
+                  <a:schemeClr val="tx1"/>
+                </a:solidFill>
+                <a:effectLst/>
+                <a:latin typeface="Century Gothic" panose="020B0502020202020204" pitchFamily="34" charset="0"/>
+              </a:rPr>
+              <a:t>tahmin</a:t>
+            </a:r>
+            <a:r>
+              <a:rPr kumimoji="0" lang="en-US" altLang="en-US" b="0" i="0" u="none" strike="noStrike" cap="none" normalizeH="0" baseline="0" dirty="0">
+                <a:ln>
+                  <a:noFill/>
+                </a:ln>
+                <a:solidFill>
+                  <a:schemeClr val="tx1"/>
+                </a:solidFill>
+                <a:effectLst/>
+                <a:latin typeface="Century Gothic" panose="020B0502020202020204" pitchFamily="34" charset="0"/>
+              </a:rPr>
+              <a:t> </a:t>
+            </a:r>
+            <a:r>
+              <a:rPr kumimoji="0" lang="en-US" altLang="en-US" b="0" i="0" u="none" strike="noStrike" cap="none" normalizeH="0" baseline="0" dirty="0" err="1">
+                <a:ln>
+                  <a:noFill/>
+                </a:ln>
+                <a:solidFill>
+                  <a:schemeClr val="tx1"/>
+                </a:solidFill>
+                <a:effectLst/>
+                <a:latin typeface="Century Gothic" panose="020B0502020202020204" pitchFamily="34" charset="0"/>
+              </a:rPr>
+              <a:t>etmek</a:t>
+            </a:r>
+            <a:r>
+              <a:rPr kumimoji="0" lang="en-US" altLang="en-US" b="0" i="0" u="none" strike="noStrike" cap="none" normalizeH="0" baseline="0" dirty="0">
+                <a:ln>
+                  <a:noFill/>
+                </a:ln>
+                <a:solidFill>
+                  <a:schemeClr val="tx1"/>
+                </a:solidFill>
+                <a:effectLst/>
+                <a:latin typeface="Century Gothic" panose="020B0502020202020204" pitchFamily="34" charset="0"/>
+              </a:rPr>
+              <a:t> </a:t>
+            </a:r>
+            <a:r>
+              <a:rPr kumimoji="0" lang="en-US" altLang="en-US" b="0" i="0" u="none" strike="noStrike" cap="none" normalizeH="0" baseline="0" dirty="0" err="1">
+                <a:ln>
+                  <a:noFill/>
+                </a:ln>
+                <a:solidFill>
+                  <a:schemeClr val="tx1"/>
+                </a:solidFill>
+                <a:effectLst/>
+                <a:latin typeface="Century Gothic" panose="020B0502020202020204" pitchFamily="34" charset="0"/>
+              </a:rPr>
+              <a:t>için</a:t>
+            </a:r>
+            <a:r>
+              <a:rPr kumimoji="0" lang="en-US" altLang="en-US" b="0" i="0" u="none" strike="noStrike" cap="none" normalizeH="0" baseline="0" dirty="0">
+                <a:ln>
+                  <a:noFill/>
+                </a:ln>
+                <a:solidFill>
+                  <a:schemeClr val="tx1"/>
+                </a:solidFill>
+                <a:effectLst/>
+                <a:latin typeface="Century Gothic" panose="020B0502020202020204" pitchFamily="34" charset="0"/>
+              </a:rPr>
+              <a:t> </a:t>
+            </a:r>
+            <a:r>
+              <a:rPr kumimoji="0" lang="en-US" altLang="en-US" b="0" i="0" u="none" strike="noStrike" cap="none" normalizeH="0" baseline="0" dirty="0" err="1">
+                <a:ln>
+                  <a:noFill/>
+                </a:ln>
+                <a:solidFill>
+                  <a:schemeClr val="tx1"/>
+                </a:solidFill>
+                <a:effectLst/>
+                <a:latin typeface="Century Gothic" panose="020B0502020202020204" pitchFamily="34" charset="0"/>
+              </a:rPr>
+              <a:t>kullanılır</a:t>
+            </a:r>
+            <a:r>
+              <a:rPr kumimoji="0" lang="en-US" altLang="en-US" b="0" i="0" u="none" strike="noStrike" cap="none" normalizeH="0" baseline="0" dirty="0">
+                <a:ln>
+                  <a:noFill/>
+                </a:ln>
+                <a:solidFill>
+                  <a:schemeClr val="tx1"/>
+                </a:solidFill>
+                <a:effectLst/>
+                <a:latin typeface="Century Gothic" panose="020B0502020202020204" pitchFamily="34" charset="0"/>
+              </a:rPr>
+              <a:t>. Bu </a:t>
+            </a:r>
+            <a:r>
+              <a:rPr kumimoji="0" lang="en-US" altLang="en-US" b="0" i="0" u="none" strike="noStrike" cap="none" normalizeH="0" baseline="0" dirty="0" err="1">
+                <a:ln>
+                  <a:noFill/>
+                </a:ln>
+                <a:solidFill>
+                  <a:schemeClr val="tx1"/>
+                </a:solidFill>
+                <a:effectLst/>
+                <a:latin typeface="Century Gothic" panose="020B0502020202020204" pitchFamily="34" charset="0"/>
+              </a:rPr>
+              <a:t>yöntem</a:t>
+            </a:r>
+            <a:r>
+              <a:rPr kumimoji="0" lang="en-US" altLang="en-US" b="0" i="0" u="none" strike="noStrike" cap="none" normalizeH="0" baseline="0" dirty="0">
+                <a:ln>
+                  <a:noFill/>
+                </a:ln>
+                <a:solidFill>
+                  <a:schemeClr val="tx1"/>
+                </a:solidFill>
+                <a:effectLst/>
+                <a:latin typeface="Century Gothic" panose="020B0502020202020204" pitchFamily="34" charset="0"/>
+              </a:rPr>
+              <a:t>, </a:t>
+            </a:r>
+            <a:r>
+              <a:rPr kumimoji="0" lang="en-US" altLang="en-US" b="0" i="0" u="none" strike="noStrike" cap="none" normalizeH="0" baseline="0" dirty="0" err="1">
+                <a:ln>
+                  <a:noFill/>
+                </a:ln>
+                <a:solidFill>
+                  <a:schemeClr val="tx1"/>
+                </a:solidFill>
+                <a:effectLst/>
+                <a:latin typeface="Century Gothic" panose="020B0502020202020204" pitchFamily="34" charset="0"/>
+              </a:rPr>
+              <a:t>robotun</a:t>
+            </a:r>
+            <a:r>
+              <a:rPr kumimoji="0" lang="en-US" altLang="en-US" b="0" i="0" u="none" strike="noStrike" cap="none" normalizeH="0" baseline="0" dirty="0">
+                <a:ln>
+                  <a:noFill/>
+                </a:ln>
+                <a:solidFill>
+                  <a:schemeClr val="tx1"/>
+                </a:solidFill>
+                <a:effectLst/>
+                <a:latin typeface="Century Gothic" panose="020B0502020202020204" pitchFamily="34" charset="0"/>
+              </a:rPr>
+              <a:t> </a:t>
+            </a:r>
+            <a:r>
+              <a:rPr kumimoji="0" lang="en-US" altLang="en-US" b="0" i="0" u="none" strike="noStrike" cap="none" normalizeH="0" baseline="0" dirty="0" err="1">
+                <a:ln>
+                  <a:noFill/>
+                </a:ln>
+                <a:solidFill>
+                  <a:schemeClr val="tx1"/>
+                </a:solidFill>
+                <a:effectLst/>
+                <a:latin typeface="Century Gothic" panose="020B0502020202020204" pitchFamily="34" charset="0"/>
+              </a:rPr>
+              <a:t>politikalarını</a:t>
+            </a:r>
+            <a:r>
+              <a:rPr kumimoji="0" lang="en-US" altLang="en-US" b="0" i="0" u="none" strike="noStrike" cap="none" normalizeH="0" baseline="0" dirty="0">
+                <a:ln>
+                  <a:noFill/>
+                </a:ln>
+                <a:solidFill>
+                  <a:schemeClr val="tx1"/>
+                </a:solidFill>
+                <a:effectLst/>
+                <a:latin typeface="Century Gothic" panose="020B0502020202020204" pitchFamily="34" charset="0"/>
+              </a:rPr>
+              <a:t> </a:t>
+            </a:r>
+            <a:r>
+              <a:rPr kumimoji="0" lang="en-US" altLang="en-US" b="0" i="0" u="none" strike="noStrike" cap="none" normalizeH="0" baseline="0" dirty="0" err="1">
+                <a:ln>
+                  <a:noFill/>
+                </a:ln>
+                <a:solidFill>
+                  <a:schemeClr val="tx1"/>
+                </a:solidFill>
+                <a:effectLst/>
+                <a:latin typeface="Century Gothic" panose="020B0502020202020204" pitchFamily="34" charset="0"/>
+              </a:rPr>
+              <a:t>daha</a:t>
+            </a:r>
+            <a:r>
+              <a:rPr kumimoji="0" lang="en-US" altLang="en-US" b="0" i="0" u="none" strike="noStrike" cap="none" normalizeH="0" baseline="0" dirty="0">
+                <a:ln>
+                  <a:noFill/>
+                </a:ln>
+                <a:solidFill>
+                  <a:schemeClr val="tx1"/>
+                </a:solidFill>
+                <a:effectLst/>
+                <a:latin typeface="Century Gothic" panose="020B0502020202020204" pitchFamily="34" charset="0"/>
+              </a:rPr>
+              <a:t> </a:t>
+            </a:r>
+            <a:r>
+              <a:rPr kumimoji="0" lang="en-US" altLang="en-US" b="0" i="0" u="none" strike="noStrike" cap="none" normalizeH="0" baseline="0" dirty="0" err="1">
+                <a:ln>
+                  <a:noFill/>
+                </a:ln>
+                <a:solidFill>
+                  <a:schemeClr val="tx1"/>
+                </a:solidFill>
+                <a:effectLst/>
+                <a:latin typeface="Century Gothic" panose="020B0502020202020204" pitchFamily="34" charset="0"/>
+              </a:rPr>
+              <a:t>hızlı</a:t>
+            </a:r>
+            <a:r>
+              <a:rPr kumimoji="0" lang="en-US" altLang="en-US" b="0" i="0" u="none" strike="noStrike" cap="none" normalizeH="0" baseline="0" dirty="0">
+                <a:ln>
+                  <a:noFill/>
+                </a:ln>
+                <a:solidFill>
+                  <a:schemeClr val="tx1"/>
+                </a:solidFill>
+                <a:effectLst/>
+                <a:latin typeface="Century Gothic" panose="020B0502020202020204" pitchFamily="34" charset="0"/>
+              </a:rPr>
+              <a:t> </a:t>
+            </a:r>
+            <a:r>
+              <a:rPr kumimoji="0" lang="en-US" altLang="en-US" b="0" i="0" u="none" strike="noStrike" cap="none" normalizeH="0" baseline="0" dirty="0" err="1">
+                <a:ln>
+                  <a:noFill/>
+                </a:ln>
+                <a:solidFill>
+                  <a:schemeClr val="tx1"/>
+                </a:solidFill>
+                <a:effectLst/>
+                <a:latin typeface="Century Gothic" panose="020B0502020202020204" pitchFamily="34" charset="0"/>
+              </a:rPr>
+              <a:t>ve</a:t>
+            </a:r>
+            <a:r>
+              <a:rPr kumimoji="0" lang="en-US" altLang="en-US" b="0" i="0" u="none" strike="noStrike" cap="none" normalizeH="0" baseline="0" dirty="0">
+                <a:ln>
+                  <a:noFill/>
+                </a:ln>
+                <a:solidFill>
+                  <a:schemeClr val="tx1"/>
+                </a:solidFill>
+                <a:effectLst/>
+                <a:latin typeface="Century Gothic" panose="020B0502020202020204" pitchFamily="34" charset="0"/>
+              </a:rPr>
+              <a:t> </a:t>
+            </a:r>
+            <a:r>
+              <a:rPr kumimoji="0" lang="en-US" altLang="en-US" b="0" i="0" u="none" strike="noStrike" cap="none" normalizeH="0" baseline="0" dirty="0" err="1">
+                <a:ln>
+                  <a:noFill/>
+                </a:ln>
+                <a:solidFill>
+                  <a:schemeClr val="tx1"/>
+                </a:solidFill>
+                <a:effectLst/>
+                <a:latin typeface="Century Gothic" panose="020B0502020202020204" pitchFamily="34" charset="0"/>
+              </a:rPr>
+              <a:t>daha</a:t>
+            </a:r>
+            <a:r>
+              <a:rPr kumimoji="0" lang="en-US" altLang="en-US" b="0" i="0" u="none" strike="noStrike" cap="none" normalizeH="0" baseline="0" dirty="0">
+                <a:ln>
+                  <a:noFill/>
+                </a:ln>
+                <a:solidFill>
+                  <a:schemeClr val="tx1"/>
+                </a:solidFill>
+                <a:effectLst/>
+                <a:latin typeface="Century Gothic" panose="020B0502020202020204" pitchFamily="34" charset="0"/>
+              </a:rPr>
+              <a:t> </a:t>
+            </a:r>
+            <a:r>
+              <a:rPr kumimoji="0" lang="en-US" altLang="en-US" b="0" i="0" u="none" strike="noStrike" cap="none" normalizeH="0" baseline="0" dirty="0" err="1">
+                <a:ln>
+                  <a:noFill/>
+                </a:ln>
+                <a:solidFill>
+                  <a:schemeClr val="tx1"/>
+                </a:solidFill>
+                <a:effectLst/>
+                <a:latin typeface="Century Gothic" panose="020B0502020202020204" pitchFamily="34" charset="0"/>
+              </a:rPr>
+              <a:t>stabil</a:t>
+            </a:r>
+            <a:r>
+              <a:rPr kumimoji="0" lang="en-US" altLang="en-US" b="0" i="0" u="none" strike="noStrike" cap="none" normalizeH="0" baseline="0" dirty="0">
+                <a:ln>
+                  <a:noFill/>
+                </a:ln>
+                <a:solidFill>
+                  <a:schemeClr val="tx1"/>
+                </a:solidFill>
+                <a:effectLst/>
+                <a:latin typeface="Century Gothic" panose="020B0502020202020204" pitchFamily="34" charset="0"/>
+              </a:rPr>
+              <a:t> </a:t>
+            </a:r>
+            <a:r>
+              <a:rPr kumimoji="0" lang="en-US" altLang="en-US" b="0" i="0" u="none" strike="noStrike" cap="none" normalizeH="0" baseline="0" dirty="0" err="1">
+                <a:ln>
+                  <a:noFill/>
+                </a:ln>
+                <a:solidFill>
+                  <a:schemeClr val="tx1"/>
+                </a:solidFill>
+                <a:effectLst/>
+                <a:latin typeface="Century Gothic" panose="020B0502020202020204" pitchFamily="34" charset="0"/>
+              </a:rPr>
+              <a:t>bir</a:t>
+            </a:r>
+            <a:r>
+              <a:rPr kumimoji="0" lang="en-US" altLang="en-US" b="0" i="0" u="none" strike="noStrike" cap="none" normalizeH="0" baseline="0" dirty="0">
+                <a:ln>
+                  <a:noFill/>
+                </a:ln>
+                <a:solidFill>
+                  <a:schemeClr val="tx1"/>
+                </a:solidFill>
+                <a:effectLst/>
+                <a:latin typeface="Century Gothic" panose="020B0502020202020204" pitchFamily="34" charset="0"/>
+              </a:rPr>
+              <a:t> </a:t>
+            </a:r>
+            <a:r>
+              <a:rPr kumimoji="0" lang="en-US" altLang="en-US" b="0" i="0" u="none" strike="noStrike" cap="none" normalizeH="0" baseline="0" dirty="0" err="1">
+                <a:ln>
+                  <a:noFill/>
+                </a:ln>
+                <a:solidFill>
+                  <a:schemeClr val="tx1"/>
+                </a:solidFill>
+                <a:effectLst/>
+                <a:latin typeface="Century Gothic" panose="020B0502020202020204" pitchFamily="34" charset="0"/>
+              </a:rPr>
+              <a:t>şekilde</a:t>
+            </a:r>
+            <a:r>
+              <a:rPr kumimoji="0" lang="en-US" altLang="en-US" b="0" i="0" u="none" strike="noStrike" cap="none" normalizeH="0" baseline="0" dirty="0">
+                <a:ln>
+                  <a:noFill/>
+                </a:ln>
+                <a:solidFill>
+                  <a:schemeClr val="tx1"/>
+                </a:solidFill>
+                <a:effectLst/>
+                <a:latin typeface="Century Gothic" panose="020B0502020202020204" pitchFamily="34" charset="0"/>
+              </a:rPr>
+              <a:t> </a:t>
+            </a:r>
+            <a:r>
+              <a:rPr kumimoji="0" lang="en-US" altLang="en-US" b="0" i="0" u="none" strike="noStrike" cap="none" normalizeH="0" baseline="0" dirty="0" err="1">
+                <a:ln>
+                  <a:noFill/>
+                </a:ln>
+                <a:solidFill>
+                  <a:schemeClr val="tx1"/>
+                </a:solidFill>
+                <a:effectLst/>
+                <a:latin typeface="Century Gothic" panose="020B0502020202020204" pitchFamily="34" charset="0"/>
+              </a:rPr>
+              <a:t>öğrenmesini</a:t>
+            </a:r>
+            <a:r>
+              <a:rPr kumimoji="0" lang="en-US" altLang="en-US" b="0" i="0" u="none" strike="noStrike" cap="none" normalizeH="0" baseline="0" dirty="0">
+                <a:ln>
+                  <a:noFill/>
+                </a:ln>
+                <a:solidFill>
+                  <a:schemeClr val="tx1"/>
+                </a:solidFill>
+                <a:effectLst/>
+                <a:latin typeface="Century Gothic" panose="020B0502020202020204" pitchFamily="34" charset="0"/>
+              </a:rPr>
+              <a:t> </a:t>
+            </a:r>
+            <a:r>
+              <a:rPr kumimoji="0" lang="en-US" altLang="en-US" b="0" i="0" u="none" strike="noStrike" cap="none" normalizeH="0" baseline="0" dirty="0" err="1">
+                <a:ln>
+                  <a:noFill/>
+                </a:ln>
+                <a:solidFill>
+                  <a:schemeClr val="tx1"/>
+                </a:solidFill>
+                <a:effectLst/>
+                <a:latin typeface="Century Gothic" panose="020B0502020202020204" pitchFamily="34" charset="0"/>
+              </a:rPr>
+              <a:t>sağlar</a:t>
+            </a:r>
+            <a:r>
+              <a:rPr kumimoji="0" lang="en-US" altLang="en-US" b="0" i="0" u="none" strike="noStrike" cap="none" normalizeH="0" baseline="0" dirty="0">
+                <a:ln>
+                  <a:noFill/>
+                </a:ln>
+                <a:solidFill>
+                  <a:schemeClr val="tx1"/>
+                </a:solidFill>
+                <a:effectLst/>
+                <a:latin typeface="Century Gothic" panose="020B0502020202020204" pitchFamily="34" charset="0"/>
+              </a:rPr>
+              <a:t>.</a:t>
+            </a:r>
+          </a:p>
+          <a:p>
+            <a:pPr marL="0" marR="0" lvl="0" indent="0" algn="l" defTabSz="914400" rtl="0" eaLnBrk="0" fontAlgn="base" latinLnBrk="0" hangingPunct="0">
+              <a:lnSpc>
+                <a:spcPct val="100000"/>
+              </a:lnSpc>
+              <a:spcBef>
+                <a:spcPct val="0"/>
+              </a:spcBef>
+              <a:spcAft>
+                <a:spcPct val="0"/>
+              </a:spcAft>
+              <a:buClrTx/>
+              <a:buSzTx/>
+              <a:buFontTx/>
+              <a:buNone/>
+              <a:tabLst/>
+            </a:pPr>
+            <a:endParaRPr kumimoji="0" lang="en-US" altLang="en-US" b="0" i="0" u="none" strike="noStrike" cap="none" normalizeH="0" baseline="0" dirty="0">
+              <a:ln>
+                <a:noFill/>
+              </a:ln>
+              <a:solidFill>
+                <a:schemeClr val="tx1"/>
+              </a:solidFill>
+              <a:effectLst/>
+              <a:latin typeface="Century Gothic" panose="020B0502020202020204" pitchFamily="34" charset="0"/>
+            </a:endParaRPr>
+          </a:p>
+          <a:p>
+            <a:pPr marL="0" marR="0" lvl="0" indent="0" algn="l" defTabSz="914400" rtl="0" eaLnBrk="0" fontAlgn="base" latinLnBrk="0" hangingPunct="0">
+              <a:lnSpc>
+                <a:spcPct val="100000"/>
+              </a:lnSpc>
+              <a:spcBef>
+                <a:spcPct val="0"/>
+              </a:spcBef>
+              <a:spcAft>
+                <a:spcPct val="0"/>
+              </a:spcAft>
+              <a:buClrTx/>
+              <a:buSzTx/>
+              <a:buFontTx/>
+              <a:buNone/>
+              <a:tabLst/>
+            </a:pPr>
+            <a:endParaRPr kumimoji="0" lang="en-US" altLang="en-US" b="0" i="0" u="none" strike="noStrike" cap="none" normalizeH="0" baseline="0" dirty="0">
+              <a:ln>
+                <a:noFill/>
+              </a:ln>
+              <a:solidFill>
+                <a:schemeClr val="tx1"/>
+              </a:solidFill>
+              <a:effectLst/>
+              <a:latin typeface="Century Gothic" panose="020B0502020202020204" pitchFamily="34" charset="0"/>
+            </a:endParaRPr>
+          </a:p>
+        </p:txBody>
+      </p:sp>
+    </p:spTree>
+    <p:extLst>
+      <p:ext uri="{BB962C8B-B14F-4D97-AF65-F5344CB8AC3E}">
+        <p14:creationId xmlns:p14="http://schemas.microsoft.com/office/powerpoint/2010/main" val="1856079822"/>
+      </p:ext>
+    </p:extLst>
+  </p:cSld>
+  <p:clrMapOvr>
+    <a:masterClrMapping/>
+  </p:clrMapOvr>
+</p:sld>
+</file>
+
+<file path=ppt/slides/slide4.xml><?xml version="1.0" encoding="utf-8"?>
 <p:sld xmlns:a="http://schemas.openxmlformats.org/drawingml/2006/main" xmlns:r="http://schemas.openxmlformats.org/officeDocument/2006/relationships" xmlns:p="http://schemas.openxmlformats.org/presentationml/2006/main">
   <p:cSld>
     <p:spTree>
@@ -11877,7 +13095,7 @@
 </p:sld>
 </file>
 
-<file path=ppt/slides/slide4.xml><?xml version="1.0" encoding="utf-8"?>
+<file path=ppt/slides/slide5.xml><?xml version="1.0" encoding="utf-8"?>
 <p:sld xmlns:a="http://schemas.openxmlformats.org/drawingml/2006/main" xmlns:r="http://schemas.openxmlformats.org/officeDocument/2006/relationships" xmlns:p="http://schemas.openxmlformats.org/presentationml/2006/main">
   <p:cSld>
     <p:spTree>
@@ -12102,7 +13320,7 @@
 </p:sld>
 </file>
 
-<file path=ppt/slides/slide5.xml><?xml version="1.0" encoding="utf-8"?>
+<file path=ppt/slides/slide6.xml><?xml version="1.0" encoding="utf-8"?>
 <p:sld xmlns:a="http://schemas.openxmlformats.org/drawingml/2006/main" xmlns:r="http://schemas.openxmlformats.org/officeDocument/2006/relationships" xmlns:p="http://schemas.openxmlformats.org/presentationml/2006/main">
   <p:cSld>
     <p:spTree>
@@ -12272,7 +13490,7 @@
 </p:sld>
 </file>
 
-<file path=ppt/slides/slide6.xml><?xml version="1.0" encoding="utf-8"?>
+<file path=ppt/slides/slide7.xml><?xml version="1.0" encoding="utf-8"?>
 <p:sld xmlns:a="http://schemas.openxmlformats.org/drawingml/2006/main" xmlns:r="http://schemas.openxmlformats.org/officeDocument/2006/relationships" xmlns:p="http://schemas.openxmlformats.org/presentationml/2006/main">
   <p:cSld>
     <p:spTree>
@@ -12422,7 +13640,7 @@
 </p:sld>
 </file>
 
-<file path=ppt/slides/slide7.xml><?xml version="1.0" encoding="utf-8"?>
+<file path=ppt/slides/slide8.xml><?xml version="1.0" encoding="utf-8"?>
 <p:sld xmlns:a="http://schemas.openxmlformats.org/drawingml/2006/main" xmlns:r="http://schemas.openxmlformats.org/officeDocument/2006/relationships" xmlns:p="http://schemas.openxmlformats.org/presentationml/2006/main">
   <p:cSld>
     <p:spTree>
@@ -12523,7 +13741,7 @@
 </p:sld>
 </file>
 
-<file path=ppt/slides/slide8.xml><?xml version="1.0" encoding="utf-8"?>
+<file path=ppt/slides/slide9.xml><?xml version="1.0" encoding="utf-8"?>
 <p:sld xmlns:a="http://schemas.openxmlformats.org/drawingml/2006/main" xmlns:r="http://schemas.openxmlformats.org/officeDocument/2006/relationships" xmlns:p="http://schemas.openxmlformats.org/presentationml/2006/main">
   <p:cSld>
     <p:spTree>
@@ -12731,258 +13949,6 @@
     <p:extLst>
       <p:ext uri="{BB962C8B-B14F-4D97-AF65-F5344CB8AC3E}">
         <p14:creationId xmlns:p14="http://schemas.microsoft.com/office/powerpoint/2010/main" val="3949669272"/>
-      </p:ext>
-    </p:extLst>
-  </p:cSld>
-  <p:clrMapOvr>
-    <a:masterClrMapping/>
-  </p:clrMapOvr>
-</p:sld>
-</file>
-
-<file path=ppt/slides/slide9.xml><?xml version="1.0" encoding="utf-8"?>
-<p:sld xmlns:a="http://schemas.openxmlformats.org/drawingml/2006/main" xmlns:r="http://schemas.openxmlformats.org/officeDocument/2006/relationships" xmlns:p="http://schemas.openxmlformats.org/presentationml/2006/main">
-  <p:cSld>
-    <p:spTree>
-      <p:nvGrpSpPr>
-        <p:cNvPr id="1" name=""/>
-        <p:cNvGrpSpPr/>
-        <p:nvPr/>
-      </p:nvGrpSpPr>
-      <p:grpSpPr>
-        <a:xfrm>
-          <a:off x="0" y="0"/>
-          <a:ext cx="0" cy="0"/>
-          <a:chOff x="0" y="0"/>
-          <a:chExt cx="0" cy="0"/>
-        </a:xfrm>
-      </p:grpSpPr>
-      <p:sp>
-        <p:nvSpPr>
-          <p:cNvPr id="3" name="Content Placeholder 2">
-            <a:extLst>
-              <a:ext uri="{FF2B5EF4-FFF2-40B4-BE49-F238E27FC236}">
-                <a16:creationId xmlns:a16="http://schemas.microsoft.com/office/drawing/2014/main" id="{EFB5EBAB-9ACA-143B-45F3-15BFDCCC666F}"/>
-              </a:ext>
-            </a:extLst>
-          </p:cNvPr>
-          <p:cNvSpPr>
-            <a:spLocks noGrp="1"/>
-          </p:cNvSpPr>
-          <p:nvPr>
-            <p:ph idx="1"/>
-          </p:nvPr>
-        </p:nvSpPr>
-        <p:spPr>
-          <a:xfrm>
-            <a:off x="685801" y="-1875521"/>
-            <a:ext cx="10131425" cy="8156180"/>
-          </a:xfrm>
-        </p:spPr>
-        <p:txBody>
-          <a:bodyPr>
-            <a:normAutofit/>
-          </a:bodyPr>
-          <a:lstStyle/>
-          <a:p>
-            <a:pPr marL="0" indent="0">
-              <a:buNone/>
-            </a:pPr>
-            <a:r>
-              <a:rPr lang="tr-TR" sz="3500" dirty="0">
-                <a:latin typeface="Century Gothic" panose="020B0502020202020204" pitchFamily="34" charset="0"/>
-              </a:rPr>
-              <a:t>	</a:t>
-            </a:r>
-          </a:p>
-          <a:p>
-            <a:pPr marL="0" indent="0">
-              <a:buNone/>
-            </a:pPr>
-            <a:endParaRPr lang="tr-TR" sz="3500" dirty="0">
-              <a:latin typeface="Century Gothic" panose="020B0502020202020204" pitchFamily="34" charset="0"/>
-            </a:endParaRPr>
-          </a:p>
-          <a:p>
-            <a:pPr marL="0" indent="0">
-              <a:buNone/>
-            </a:pPr>
-            <a:endParaRPr lang="tr-TR" sz="3500" dirty="0">
-              <a:latin typeface="Century Gothic" panose="020B0502020202020204" pitchFamily="34" charset="0"/>
-            </a:endParaRPr>
-          </a:p>
-          <a:p>
-            <a:pPr marL="0" indent="0">
-              <a:buNone/>
-            </a:pPr>
-            <a:endParaRPr lang="tr-TR" sz="3500" dirty="0">
-              <a:latin typeface="Century Gothic" panose="020B0502020202020204" pitchFamily="34" charset="0"/>
-            </a:endParaRPr>
-          </a:p>
-          <a:p>
-            <a:pPr marL="0" indent="0">
-              <a:buNone/>
-            </a:pPr>
-            <a:r>
-              <a:rPr lang="tr-TR" sz="3500" b="1" dirty="0" err="1">
-                <a:latin typeface="Century Gothic" panose="020B0502020202020204" pitchFamily="34" charset="0"/>
-              </a:rPr>
-              <a:t>Off-Policy</a:t>
-            </a:r>
-            <a:r>
-              <a:rPr lang="tr-TR" sz="3500" b="1" dirty="0">
-                <a:latin typeface="Century Gothic" panose="020B0502020202020204" pitchFamily="34" charset="0"/>
-              </a:rPr>
-              <a:t> Algoritma için SAC :</a:t>
-            </a:r>
-          </a:p>
-          <a:p>
-            <a:pPr marL="0" indent="0">
-              <a:buNone/>
-            </a:pPr>
-            <a:endParaRPr lang="tr-TR" b="1" dirty="0"/>
-          </a:p>
-          <a:p>
-            <a:pPr marL="0" indent="0">
-              <a:buNone/>
-            </a:pPr>
-            <a:r>
-              <a:rPr lang="tr-TR" sz="2800" dirty="0">
-                <a:latin typeface="Century Gothic" panose="020B0502020202020204" pitchFamily="34" charset="0"/>
-              </a:rPr>
-              <a:t>-</a:t>
-            </a:r>
-            <a:r>
-              <a:rPr lang="en-GB" sz="2800" dirty="0">
-                <a:latin typeface="Century Gothic" panose="020B0502020202020204" pitchFamily="34" charset="0"/>
-              </a:rPr>
-              <a:t> </a:t>
-            </a:r>
-            <a:r>
-              <a:rPr lang="tr-TR" sz="2800" dirty="0" err="1">
-                <a:latin typeface="Century Gothic" panose="020B0502020202020204" pitchFamily="34" charset="0"/>
-              </a:rPr>
-              <a:t>Replay</a:t>
-            </a:r>
-            <a:r>
-              <a:rPr lang="tr-TR" sz="2800" dirty="0">
-                <a:latin typeface="Century Gothic" panose="020B0502020202020204" pitchFamily="34" charset="0"/>
-              </a:rPr>
-              <a:t> </a:t>
-            </a:r>
-            <a:r>
-              <a:rPr lang="tr-TR" sz="2800" dirty="0" err="1">
-                <a:latin typeface="Century Gothic" panose="020B0502020202020204" pitchFamily="34" charset="0"/>
-              </a:rPr>
-              <a:t>Buffer</a:t>
-            </a:r>
-            <a:r>
-              <a:rPr lang="tr-TR" sz="2800" dirty="0">
-                <a:latin typeface="Century Gothic" panose="020B0502020202020204" pitchFamily="34" charset="0"/>
-              </a:rPr>
-              <a:t> kullanarak veri verimliliğini artırır ve önceki deneyimlerden öğrenme yapar.</a:t>
-            </a:r>
-          </a:p>
-          <a:p>
-            <a:pPr marL="0" indent="0">
-              <a:buNone/>
-            </a:pPr>
-            <a:r>
-              <a:rPr lang="tr-TR" sz="2800" dirty="0">
-                <a:latin typeface="Century Gothic" panose="020B0502020202020204" pitchFamily="34" charset="0"/>
-              </a:rPr>
-              <a:t>-</a:t>
-            </a:r>
-            <a:r>
-              <a:rPr lang="en-GB" sz="2800" dirty="0">
-                <a:latin typeface="Century Gothic" panose="020B0502020202020204" pitchFamily="34" charset="0"/>
-              </a:rPr>
-              <a:t> </a:t>
-            </a:r>
-            <a:r>
-              <a:rPr lang="tr-TR" sz="2800" dirty="0">
-                <a:latin typeface="Century Gothic" panose="020B0502020202020204" pitchFamily="34" charset="0"/>
-              </a:rPr>
-              <a:t>Eğitim süreci daha kararlı ve hızlıdır.</a:t>
-            </a:r>
-          </a:p>
-          <a:p>
-            <a:pPr marL="0" indent="0">
-              <a:buNone/>
-            </a:pPr>
-            <a:endParaRPr lang="tr-TR" dirty="0"/>
-          </a:p>
-          <a:p>
-            <a:pPr marL="0" indent="0">
-              <a:buNone/>
-            </a:pPr>
-            <a:r>
-              <a:rPr lang="tr-TR" sz="3500" b="1" dirty="0" err="1">
-                <a:latin typeface="Century Gothic" panose="020B0502020202020204" pitchFamily="34" charset="0"/>
-              </a:rPr>
-              <a:t>Soft</a:t>
-            </a:r>
-            <a:r>
-              <a:rPr lang="tr-TR" sz="3500" b="1" dirty="0">
-                <a:latin typeface="Century Gothic" panose="020B0502020202020204" pitchFamily="34" charset="0"/>
-              </a:rPr>
-              <a:t> </a:t>
-            </a:r>
-            <a:r>
-              <a:rPr lang="tr-TR" sz="3500" b="1" dirty="0" err="1">
-                <a:latin typeface="Century Gothic" panose="020B0502020202020204" pitchFamily="34" charset="0"/>
-              </a:rPr>
-              <a:t>Policy</a:t>
-            </a:r>
-            <a:r>
-              <a:rPr lang="tr-TR" sz="3500" b="1" dirty="0">
-                <a:latin typeface="Century Gothic" panose="020B0502020202020204" pitchFamily="34" charset="0"/>
-              </a:rPr>
-              <a:t> Algoritma için SAC :</a:t>
-            </a:r>
-          </a:p>
-          <a:p>
-            <a:pPr marL="0" indent="0">
-              <a:buNone/>
-            </a:pPr>
-            <a:endParaRPr lang="tr-TR" sz="3500" dirty="0">
-              <a:solidFill>
-                <a:schemeClr val="bg2">
-                  <a:lumMod val="50000"/>
-                </a:schemeClr>
-              </a:solidFill>
-              <a:latin typeface="Century Gothic" panose="020B0502020202020204" pitchFamily="34" charset="0"/>
-            </a:endParaRPr>
-          </a:p>
-          <a:p>
-            <a:pPr marL="0" indent="0">
-              <a:buNone/>
-            </a:pPr>
-            <a:r>
-              <a:rPr lang="tr-TR" sz="2800" dirty="0">
-                <a:latin typeface="Century Gothic" panose="020B0502020202020204" pitchFamily="34" charset="0"/>
-              </a:rPr>
-              <a:t>-</a:t>
-            </a:r>
-            <a:r>
-              <a:rPr lang="en-GB" sz="2800" dirty="0">
-                <a:latin typeface="Century Gothic" panose="020B0502020202020204" pitchFamily="34" charset="0"/>
-              </a:rPr>
-              <a:t> </a:t>
-            </a:r>
-            <a:r>
-              <a:rPr lang="tr-TR" sz="2800" dirty="0">
-                <a:latin typeface="Century Gothic" panose="020B0502020202020204" pitchFamily="34" charset="0"/>
-              </a:rPr>
-              <a:t>Politika, sadece maksimum ödülü değil, aynı zamanda entropiyi artırmayı da hedefler. Bu, ajanların gereksiz yere kararsızlığa düşmesini önler.</a:t>
-            </a:r>
-          </a:p>
-        </p:txBody>
-      </p:sp>
-    </p:spTree>
-    <p:extLst>
-      <p:ext uri="{BB962C8B-B14F-4D97-AF65-F5344CB8AC3E}">
-        <p14:creationId xmlns:p14="http://schemas.microsoft.com/office/powerpoint/2010/main" val="1538237826"/>
       </p:ext>
     </p:extLst>
   </p:cSld>

</xml_diff>

<commit_message>
Master 6 | Update
</commit_message>
<xml_diff>
--- a/sunum.pptx
+++ b/sunum.pptx
@@ -8283,7 +8283,7 @@
         </p:nvSpPr>
         <p:spPr>
           <a:xfrm>
-            <a:off x="2872233" y="5120663"/>
+            <a:off x="2872233" y="5752568"/>
             <a:ext cx="6447534" cy="369332"/>
           </a:xfrm>
           <a:prstGeom prst="rect">
@@ -8318,6 +8318,122 @@
                 <a:latin typeface="Century Gothic" panose="020B0502020202020204" pitchFamily="34" charset="0"/>
               </a:rPr>
               <a:t>ortamı çalıştırılamamıştır.</a:t>
+            </a:r>
+            <a:endParaRPr lang="en-GB" dirty="0"/>
+          </a:p>
+        </p:txBody>
+      </p:sp>
+      <p:sp>
+        <p:nvSpPr>
+          <p:cNvPr id="2" name="TextBox 1">
+            <a:extLst>
+              <a:ext uri="{FF2B5EF4-FFF2-40B4-BE49-F238E27FC236}">
+                <a16:creationId xmlns:a16="http://schemas.microsoft.com/office/drawing/2014/main" id="{CD760106-0E11-4174-5F5C-2D3B2B65BBDE}"/>
+              </a:ext>
+            </a:extLst>
+          </p:cNvPr>
+          <p:cNvSpPr txBox="1"/>
+          <p:nvPr/>
+        </p:nvSpPr>
+        <p:spPr>
+          <a:xfrm>
+            <a:off x="1604513" y="4813540"/>
+            <a:ext cx="2613804" cy="646331"/>
+          </a:xfrm>
+          <a:prstGeom prst="rect">
+            <a:avLst/>
+          </a:prstGeom>
+          <a:noFill/>
+        </p:spPr>
+        <p:txBody>
+          <a:bodyPr wrap="square" rtlCol="0">
+            <a:spAutoFit/>
+          </a:bodyPr>
+          <a:lstStyle/>
+          <a:p>
+            <a:r>
+              <a:rPr lang="en-GB" dirty="0"/>
+              <a:t>Runtime: </a:t>
+            </a:r>
+            <a:r>
+              <a:rPr lang="en-GB" dirty="0" err="1"/>
+              <a:t>ya</a:t>
+            </a:r>
+            <a:r>
+              <a:rPr lang="tr-TR" dirty="0" err="1"/>
+              <a:t>klaşık</a:t>
+            </a:r>
+            <a:r>
+              <a:rPr lang="tr-TR" dirty="0"/>
+              <a:t> 5dk </a:t>
+            </a:r>
+          </a:p>
+          <a:p>
+            <a:r>
+              <a:rPr lang="tr-TR" dirty="0" err="1"/>
+              <a:t>Episode</a:t>
+            </a:r>
+            <a:r>
+              <a:rPr lang="tr-TR" dirty="0"/>
+              <a:t>: 50</a:t>
+            </a:r>
+            <a:endParaRPr lang="en-GB" dirty="0"/>
+          </a:p>
+        </p:txBody>
+      </p:sp>
+      <p:sp>
+        <p:nvSpPr>
+          <p:cNvPr id="3" name="TextBox 2">
+            <a:extLst>
+              <a:ext uri="{FF2B5EF4-FFF2-40B4-BE49-F238E27FC236}">
+                <a16:creationId xmlns:a16="http://schemas.microsoft.com/office/drawing/2014/main" id="{B32ED4A2-0F9F-FCD9-C029-3EF176EB6327}"/>
+              </a:ext>
+            </a:extLst>
+          </p:cNvPr>
+          <p:cNvSpPr txBox="1"/>
+          <p:nvPr/>
+        </p:nvSpPr>
+        <p:spPr>
+          <a:xfrm>
+            <a:off x="7403934" y="4796020"/>
+            <a:ext cx="2613804" cy="646331"/>
+          </a:xfrm>
+          <a:prstGeom prst="rect">
+            <a:avLst/>
+          </a:prstGeom>
+          <a:noFill/>
+        </p:spPr>
+        <p:txBody>
+          <a:bodyPr wrap="square" rtlCol="0">
+            <a:spAutoFit/>
+          </a:bodyPr>
+          <a:lstStyle/>
+          <a:p>
+            <a:r>
+              <a:rPr lang="en-GB" dirty="0"/>
+              <a:t>Runtime: </a:t>
+            </a:r>
+            <a:r>
+              <a:rPr lang="en-GB" dirty="0" err="1"/>
+              <a:t>ya</a:t>
+            </a:r>
+            <a:r>
+              <a:rPr lang="tr-TR" dirty="0" err="1"/>
+              <a:t>klaşık</a:t>
+            </a:r>
+            <a:r>
+              <a:rPr lang="tr-TR" dirty="0"/>
+              <a:t> 15dk</a:t>
+            </a:r>
+          </a:p>
+          <a:p>
+            <a:r>
+              <a:rPr lang="tr-TR" dirty="0" err="1"/>
+              <a:t>Episode</a:t>
+            </a:r>
+            <a:r>
+              <a:rPr lang="tr-TR" dirty="0"/>
+              <a:t>: 50</a:t>
             </a:r>
             <a:endParaRPr lang="en-GB" dirty="0"/>
           </a:p>
@@ -11784,6 +11900,180 @@
               <a:rPr lang="tr-TR" dirty="0"/>
               <a:t>A2C</a:t>
             </a:r>
+          </a:p>
+        </p:txBody>
+      </p:sp>
+      <p:sp>
+        <p:nvSpPr>
+          <p:cNvPr id="2" name="TextBox 1">
+            <a:extLst>
+              <a:ext uri="{FF2B5EF4-FFF2-40B4-BE49-F238E27FC236}">
+                <a16:creationId xmlns:a16="http://schemas.microsoft.com/office/drawing/2014/main" id="{EDC88C0C-C61F-B03F-DA23-4A4C6BCDA722}"/>
+              </a:ext>
+            </a:extLst>
+          </p:cNvPr>
+          <p:cNvSpPr txBox="1"/>
+          <p:nvPr/>
+        </p:nvSpPr>
+        <p:spPr>
+          <a:xfrm>
+            <a:off x="2152670" y="3443400"/>
+            <a:ext cx="2613804" cy="646331"/>
+          </a:xfrm>
+          <a:prstGeom prst="rect">
+            <a:avLst/>
+          </a:prstGeom>
+          <a:noFill/>
+        </p:spPr>
+        <p:txBody>
+          <a:bodyPr wrap="square" rtlCol="0">
+            <a:spAutoFit/>
+          </a:bodyPr>
+          <a:lstStyle/>
+          <a:p>
+            <a:r>
+              <a:rPr lang="en-GB" dirty="0"/>
+              <a:t>Runtime: </a:t>
+            </a:r>
+            <a:r>
+              <a:rPr lang="en-GB" dirty="0" err="1"/>
+              <a:t>ya</a:t>
+            </a:r>
+            <a:r>
+              <a:rPr lang="tr-TR" dirty="0" err="1"/>
+              <a:t>klaşık</a:t>
+            </a:r>
+            <a:r>
+              <a:rPr lang="tr-TR" dirty="0"/>
+              <a:t> 7dk </a:t>
+            </a:r>
+          </a:p>
+          <a:p>
+            <a:r>
+              <a:rPr lang="tr-TR" dirty="0" err="1"/>
+              <a:t>Episode</a:t>
+            </a:r>
+            <a:r>
+              <a:rPr lang="tr-TR" dirty="0"/>
+              <a:t>: 100</a:t>
+            </a:r>
+            <a:endParaRPr lang="en-GB" dirty="0"/>
+          </a:p>
+        </p:txBody>
+      </p:sp>
+      <p:sp>
+        <p:nvSpPr>
+          <p:cNvPr id="4" name="TextBox 3">
+            <a:extLst>
+              <a:ext uri="{FF2B5EF4-FFF2-40B4-BE49-F238E27FC236}">
+                <a16:creationId xmlns:a16="http://schemas.microsoft.com/office/drawing/2014/main" id="{0F2BAFA0-A56A-B11E-83CB-A620EADA348D}"/>
+              </a:ext>
+            </a:extLst>
+          </p:cNvPr>
+          <p:cNvSpPr txBox="1"/>
+          <p:nvPr/>
+        </p:nvSpPr>
+        <p:spPr>
+          <a:xfrm>
+            <a:off x="7613108" y="3519535"/>
+            <a:ext cx="2613804" cy="646331"/>
+          </a:xfrm>
+          <a:prstGeom prst="rect">
+            <a:avLst/>
+          </a:prstGeom>
+          <a:noFill/>
+        </p:spPr>
+        <p:txBody>
+          <a:bodyPr wrap="square" rtlCol="0">
+            <a:spAutoFit/>
+          </a:bodyPr>
+          <a:lstStyle/>
+          <a:p>
+            <a:r>
+              <a:rPr lang="en-GB" dirty="0"/>
+              <a:t>Runtime: </a:t>
+            </a:r>
+            <a:r>
+              <a:rPr lang="en-GB" dirty="0" err="1"/>
+              <a:t>ya</a:t>
+            </a:r>
+            <a:r>
+              <a:rPr lang="tr-TR" dirty="0" err="1"/>
+              <a:t>klaşık</a:t>
+            </a:r>
+            <a:r>
+              <a:rPr lang="tr-TR" dirty="0"/>
+              <a:t> 12dk </a:t>
+            </a:r>
+          </a:p>
+          <a:p>
+            <a:r>
+              <a:rPr lang="tr-TR" dirty="0" err="1"/>
+              <a:t>Episode</a:t>
+            </a:r>
+            <a:r>
+              <a:rPr lang="tr-TR" dirty="0"/>
+              <a:t>: 10 (10X10)</a:t>
+            </a:r>
+            <a:endParaRPr lang="en-GB" dirty="0"/>
+          </a:p>
+        </p:txBody>
+      </p:sp>
+      <p:sp>
+        <p:nvSpPr>
+          <p:cNvPr id="5" name="TextBox 4">
+            <a:extLst>
+              <a:ext uri="{FF2B5EF4-FFF2-40B4-BE49-F238E27FC236}">
+                <a16:creationId xmlns:a16="http://schemas.microsoft.com/office/drawing/2014/main" id="{1F9304BE-3702-3979-73B2-EC63A0FF121E}"/>
+              </a:ext>
+            </a:extLst>
+          </p:cNvPr>
+          <p:cNvSpPr txBox="1"/>
+          <p:nvPr/>
+        </p:nvSpPr>
+        <p:spPr>
+          <a:xfrm>
+            <a:off x="8179576" y="5957169"/>
+            <a:ext cx="2613804" cy="646331"/>
+          </a:xfrm>
+          <a:prstGeom prst="rect">
+            <a:avLst/>
+          </a:prstGeom>
+          <a:noFill/>
+        </p:spPr>
+        <p:txBody>
+          <a:bodyPr wrap="square" rtlCol="0">
+            <a:spAutoFit/>
+          </a:bodyPr>
+          <a:lstStyle/>
+          <a:p>
+            <a:r>
+              <a:rPr lang="en-GB" dirty="0"/>
+              <a:t>Runtime: </a:t>
+            </a:r>
+            <a:r>
+              <a:rPr lang="en-GB" dirty="0" err="1"/>
+              <a:t>ya</a:t>
+            </a:r>
+            <a:r>
+              <a:rPr lang="tr-TR" dirty="0" err="1"/>
+              <a:t>klaşık</a:t>
+            </a:r>
+            <a:r>
+              <a:rPr lang="tr-TR" dirty="0"/>
+              <a:t> 10dk </a:t>
+            </a:r>
+          </a:p>
+          <a:p>
+            <a:r>
+              <a:rPr lang="tr-TR" dirty="0" err="1"/>
+              <a:t>Episode</a:t>
+            </a:r>
+            <a:r>
+              <a:rPr lang="tr-TR" dirty="0"/>
+              <a:t>: 100</a:t>
+            </a:r>
+            <a:endParaRPr lang="en-GB" dirty="0"/>
           </a:p>
         </p:txBody>
       </p:sp>

</xml_diff>